<commit_message>
Update to Hugo 0.55
</commit_message>
<xml_diff>
--- a/pptx/transaccionesI.pptx
+++ b/pptx/transaccionesI.pptx
@@ -24,30 +24,31 @@
     <p:sldId id="272" r:id="rId18"/>
     <p:sldId id="273" r:id="rId19"/>
     <p:sldId id="274" r:id="rId20"/>
-    <p:sldId id="275" r:id="rId21"/>
-    <p:sldId id="278" r:id="rId22"/>
-    <p:sldId id="276" r:id="rId23"/>
-    <p:sldId id="277" r:id="rId24"/>
-    <p:sldId id="279" r:id="rId25"/>
-    <p:sldId id="280" r:id="rId26"/>
-    <p:sldId id="281" r:id="rId27"/>
-    <p:sldId id="282" r:id="rId28"/>
-    <p:sldId id="283" r:id="rId29"/>
-    <p:sldId id="284" r:id="rId30"/>
-    <p:sldId id="285" r:id="rId31"/>
-    <p:sldId id="286" r:id="rId32"/>
-    <p:sldId id="287" r:id="rId33"/>
-    <p:sldId id="288" r:id="rId34"/>
-    <p:sldId id="290" r:id="rId35"/>
-    <p:sldId id="289" r:id="rId36"/>
-    <p:sldId id="291" r:id="rId37"/>
-    <p:sldId id="292" r:id="rId38"/>
-    <p:sldId id="293" r:id="rId39"/>
-    <p:sldId id="294" r:id="rId40"/>
-    <p:sldId id="295" r:id="rId41"/>
-    <p:sldId id="296" r:id="rId42"/>
-    <p:sldId id="297" r:id="rId43"/>
-    <p:sldId id="298" r:id="rId44"/>
+    <p:sldId id="299" r:id="rId21"/>
+    <p:sldId id="275" r:id="rId22"/>
+    <p:sldId id="278" r:id="rId23"/>
+    <p:sldId id="276" r:id="rId24"/>
+    <p:sldId id="277" r:id="rId25"/>
+    <p:sldId id="279" r:id="rId26"/>
+    <p:sldId id="280" r:id="rId27"/>
+    <p:sldId id="281" r:id="rId28"/>
+    <p:sldId id="282" r:id="rId29"/>
+    <p:sldId id="283" r:id="rId30"/>
+    <p:sldId id="284" r:id="rId31"/>
+    <p:sldId id="285" r:id="rId32"/>
+    <p:sldId id="286" r:id="rId33"/>
+    <p:sldId id="287" r:id="rId34"/>
+    <p:sldId id="288" r:id="rId35"/>
+    <p:sldId id="290" r:id="rId36"/>
+    <p:sldId id="289" r:id="rId37"/>
+    <p:sldId id="291" r:id="rId38"/>
+    <p:sldId id="292" r:id="rId39"/>
+    <p:sldId id="293" r:id="rId40"/>
+    <p:sldId id="294" r:id="rId41"/>
+    <p:sldId id="295" r:id="rId42"/>
+    <p:sldId id="296" r:id="rId43"/>
+    <p:sldId id="297" r:id="rId44"/>
+    <p:sldId id="298" r:id="rId45"/>
   </p:sldIdLst>
   <p:sldSz cx="12192000" cy="6858000"/>
   <p:notesSz cx="6858000" cy="9144000"/>
@@ -146,11 +147,12 @@
       </a:defRPr>
     </a:lvl9pPr>
   </p:defaultTextStyle>
+  <p:extLst>
+    <p:ext uri="{EFAFB233-063F-42B5-8137-9DF3F51BA10A}">
+      <p15:sldGuideLst xmlns:p15="http://schemas.microsoft.com/office/powerpoint/2012/main"/>
+    </p:ext>
+  </p:extLst>
 </p:presentation>
-</file>
-
-<file path=ppt/revisionInfo.xml><?xml version="1.0" encoding="utf-8"?>
-<p1510:revInfo xmlns:a="http://schemas.openxmlformats.org/drawingml/2006/main" xmlns:r="http://schemas.openxmlformats.org/officeDocument/2006/relationships" xmlns:p1510="http://schemas.microsoft.com/office/powerpoint/2015/10/main"/>
 </file>
 
 <file path=ppt/slideLayouts/slideLayout1.xml><?xml version="1.0" encoding="utf-8"?>
@@ -399,7 +401,7 @@
             <a:fld id="{B61BEF0D-F0BB-DE4B-95CE-6DB70DBA9567}" type="datetimeFigureOut">
               <a:rPr lang="en-US" dirty="0"/>
               <a:pPr/>
-              <a:t>11/9/2017</a:t>
+              <a:t>12/10/2018</a:t>
             </a:fld>
             <a:endParaRPr lang="en-US" dirty="0"/>
           </a:p>
@@ -658,7 +660,7 @@
             <a:fld id="{B61BEF0D-F0BB-DE4B-95CE-6DB70DBA9567}" type="datetimeFigureOut">
               <a:rPr lang="en-US" dirty="0"/>
               <a:pPr/>
-              <a:t>11/9/2017</a:t>
+              <a:t>12/10/2018</a:t>
             </a:fld>
             <a:endParaRPr lang="en-US" dirty="0"/>
           </a:p>
@@ -890,7 +892,7 @@
             <a:fld id="{B61BEF0D-F0BB-DE4B-95CE-6DB70DBA9567}" type="datetimeFigureOut">
               <a:rPr lang="en-US" dirty="0"/>
               <a:pPr/>
-              <a:t>11/9/2017</a:t>
+              <a:t>12/10/2018</a:t>
             </a:fld>
             <a:endParaRPr lang="en-US" dirty="0"/>
           </a:p>
@@ -1127,7 +1129,7 @@
             <a:fld id="{B61BEF0D-F0BB-DE4B-95CE-6DB70DBA9567}" type="datetimeFigureOut">
               <a:rPr lang="en-US" dirty="0"/>
               <a:pPr/>
-              <a:t>11/9/2017</a:t>
+              <a:t>12/10/2018</a:t>
             </a:fld>
             <a:endParaRPr lang="en-US" dirty="0"/>
           </a:p>
@@ -1431,7 +1433,7 @@
             <a:fld id="{B61BEF0D-F0BB-DE4B-95CE-6DB70DBA9567}" type="datetimeFigureOut">
               <a:rPr lang="en-US" dirty="0"/>
               <a:pPr/>
-              <a:t>11/9/2017</a:t>
+              <a:t>12/10/2018</a:t>
             </a:fld>
             <a:endParaRPr lang="en-US" dirty="0"/>
           </a:p>
@@ -1730,7 +1732,7 @@
             <a:fld id="{B61BEF0D-F0BB-DE4B-95CE-6DB70DBA9567}" type="datetimeFigureOut">
               <a:rPr lang="en-US" dirty="0"/>
               <a:pPr/>
-              <a:t>11/9/2017</a:t>
+              <a:t>12/10/2018</a:t>
             </a:fld>
             <a:endParaRPr lang="en-US" dirty="0"/>
           </a:p>
@@ -2149,7 +2151,7 @@
             <a:fld id="{B61BEF0D-F0BB-DE4B-95CE-6DB70DBA9567}" type="datetimeFigureOut">
               <a:rPr lang="en-US" dirty="0"/>
               <a:pPr/>
-              <a:t>11/9/2017</a:t>
+              <a:t>12/10/2018</a:t>
             </a:fld>
             <a:endParaRPr lang="en-US" dirty="0"/>
           </a:p>
@@ -2241,7 +2243,7 @@
             <a:fld id="{B61BEF0D-F0BB-DE4B-95CE-6DB70DBA9567}" type="datetimeFigureOut">
               <a:rPr lang="en-US" dirty="0"/>
               <a:pPr/>
-              <a:t>11/9/2017</a:t>
+              <a:t>12/10/2018</a:t>
             </a:fld>
             <a:endParaRPr lang="en-US" dirty="0"/>
           </a:p>
@@ -2400,7 +2402,7 @@
             <a:fld id="{B61BEF0D-F0BB-DE4B-95CE-6DB70DBA9567}" type="datetimeFigureOut">
               <a:rPr lang="en-US" dirty="0"/>
               <a:pPr/>
-              <a:t>11/9/2017</a:t>
+              <a:t>12/10/2018</a:t>
             </a:fld>
             <a:endParaRPr lang="en-US" dirty="0"/>
           </a:p>
@@ -2775,7 +2777,7 @@
             <a:fld id="{B61BEF0D-F0BB-DE4B-95CE-6DB70DBA9567}" type="datetimeFigureOut">
               <a:rPr lang="en-US" dirty="0"/>
               <a:pPr/>
-              <a:t>11/9/2017</a:t>
+              <a:t>12/10/2018</a:t>
             </a:fld>
             <a:endParaRPr lang="en-US" dirty="0"/>
           </a:p>
@@ -3061,7 +3063,7 @@
             <a:fld id="{B61BEF0D-F0BB-DE4B-95CE-6DB70DBA9567}" type="datetimeFigureOut">
               <a:rPr lang="en-US" dirty="0"/>
               <a:pPr/>
-              <a:t>11/9/2017</a:t>
+              <a:t>12/10/2018</a:t>
             </a:fld>
             <a:endParaRPr lang="en-US" dirty="0"/>
           </a:p>
@@ -3269,7 +3271,7 @@
             <a:fld id="{B61BEF0D-F0BB-DE4B-95CE-6DB70DBA9567}" type="datetimeFigureOut">
               <a:rPr lang="en-US" dirty="0"/>
               <a:pPr/>
-              <a:t>11/9/2017</a:t>
+              <a:t>12/10/2018</a:t>
             </a:fld>
             <a:endParaRPr lang="en-US" dirty="0"/>
           </a:p>
@@ -4529,7 +4531,7 @@
           <a:p>
             <a:r>
               <a:rPr lang="es-CL" sz="3600" dirty="0"/>
-              <a:t>E/L – Lectura desfasada</a:t>
+              <a:t>E/L – Lectura sucia</a:t>
             </a:r>
           </a:p>
           <a:p>
@@ -4622,7 +4624,7 @@
             <p:ph idx="1"/>
             <p:extLst>
               <p:ext uri="{D42A27DB-BD31-4B8C-83A1-F6EECF244321}">
-                <p14:modId xmlns:p14="http://schemas.microsoft.com/office/powerpoint/2010/main" val="4280665046"/>
+                <p14:modId xmlns:p14="http://schemas.microsoft.com/office/powerpoint/2010/main" val="2489649699"/>
               </p:ext>
             </p:extLst>
           </p:nvPr>
@@ -4735,7 +4737,7 @@
                       <a:pPr algn="ctr"/>
                       <a:r>
                         <a:rPr lang="es-CL" sz="2400" dirty="0"/>
-                        <a:t>X-100</a:t>
+                        <a:t>X=X-100</a:t>
                       </a:r>
                     </a:p>
                   </a:txBody>
@@ -4826,7 +4828,7 @@
                       <a:pPr algn="ctr"/>
                       <a:r>
                         <a:rPr lang="es-CL" sz="2400" dirty="0"/>
-                        <a:t>X * 1,06</a:t>
+                        <a:t>X=X * 1,06</a:t>
                       </a:r>
                     </a:p>
                   </a:txBody>
@@ -4878,7 +4880,7 @@
                       <a:pPr algn="ctr"/>
                       <a:r>
                         <a:rPr lang="es-CL" sz="2400" dirty="0"/>
-                        <a:t>Y * 1,06</a:t>
+                        <a:t>Y=Y * 1,06</a:t>
                       </a:r>
                     </a:p>
                   </a:txBody>
@@ -4909,7 +4911,7 @@
                       <a:pPr algn="ctr"/>
                       <a:r>
                         <a:rPr lang="es-CL" sz="2400" dirty="0"/>
-                        <a:t>Y + 100</a:t>
+                        <a:t>Y=Y + 100</a:t>
                       </a:r>
                     </a:p>
                   </a:txBody>
@@ -5244,14 +5246,14 @@
             <p:ph idx="1"/>
             <p:extLst>
               <p:ext uri="{D42A27DB-BD31-4B8C-83A1-F6EECF244321}">
-                <p14:modId xmlns:p14="http://schemas.microsoft.com/office/powerpoint/2010/main" val="2662060947"/>
+                <p14:modId xmlns:p14="http://schemas.microsoft.com/office/powerpoint/2010/main" val="301298775"/>
               </p:ext>
             </p:extLst>
           </p:nvPr>
         </p:nvGraphicFramePr>
         <p:xfrm>
           <a:off x="3685309" y="2707698"/>
-          <a:ext cx="4862946" cy="2286000"/>
+          <a:ext cx="4862946" cy="2651760"/>
         </p:xfrm>
         <a:graphic>
           <a:graphicData uri="http://schemas.openxmlformats.org/drawingml/2006/table">
@@ -5503,6 +5505,14 @@
                         <a:t>RESERVA(23C)</a:t>
                       </a:r>
                     </a:p>
+                    <a:p>
+                      <a:pPr algn="ctr"/>
+                      <a:r>
+                        <a:rPr lang="es-CL" sz="2400" dirty="0" err="1"/>
+                        <a:t>Commit</a:t>
+                      </a:r>
+                      <a:endParaRPr lang="es-CL" sz="2400" dirty="0"/>
+                    </a:p>
                   </a:txBody>
                   <a:tcPr anchor="ctr">
                     <a:lnL w="12700" cap="flat" cmpd="sng" algn="ctr">
@@ -5592,7 +5602,7 @@
         </p:nvSpPr>
         <p:spPr>
           <a:xfrm rot="20938212">
-            <a:off x="5158556" y="4708695"/>
+            <a:off x="6341897" y="4887989"/>
             <a:ext cx="3662217" cy="1271335"/>
           </a:xfrm>
           <a:prstGeom prst="rect">
@@ -5866,14 +5876,14 @@
             <p:ph idx="1"/>
             <p:extLst>
               <p:ext uri="{D42A27DB-BD31-4B8C-83A1-F6EECF244321}">
-                <p14:modId xmlns:p14="http://schemas.microsoft.com/office/powerpoint/2010/main" val="1579054483"/>
+                <p14:modId xmlns:p14="http://schemas.microsoft.com/office/powerpoint/2010/main" val="3975189287"/>
               </p:ext>
             </p:extLst>
           </p:nvPr>
         </p:nvGraphicFramePr>
         <p:xfrm>
-          <a:off x="3685309" y="2707698"/>
-          <a:ext cx="4862946" cy="2286000"/>
+          <a:off x="3664527" y="2124881"/>
+          <a:ext cx="4862946" cy="3017520"/>
         </p:xfrm>
         <a:graphic>
           <a:graphicData uri="http://schemas.openxmlformats.org/drawingml/2006/table">
@@ -6120,6 +6130,29 @@
                         <a:t>ESCRIBIR(Y)</a:t>
                       </a:r>
                     </a:p>
+                    <a:p>
+                      <a:pPr marL="0" marR="0" lvl="0" indent="0" algn="ctr" defTabSz="457200" rtl="0" eaLnBrk="1" fontAlgn="auto" latinLnBrk="0" hangingPunct="1">
+                        <a:lnSpc>
+                          <a:spcPct val="100000"/>
+                        </a:lnSpc>
+                        <a:spcBef>
+                          <a:spcPts val="0"/>
+                        </a:spcBef>
+                        <a:spcAft>
+                          <a:spcPts val="0"/>
+                        </a:spcAft>
+                        <a:buClrTx/>
+                        <a:buSzTx/>
+                        <a:buFontTx/>
+                        <a:buNone/>
+                        <a:tabLst/>
+                        <a:defRPr/>
+                      </a:pPr>
+                      <a:r>
+                        <a:rPr lang="es-CL" sz="2400" dirty="0"/>
+                        <a:t>COMMIT</a:t>
+                      </a:r>
+                    </a:p>
                   </a:txBody>
                   <a:tcPr anchor="ctr">
                     <a:lnR w="12700" cap="flat" cmpd="sng" algn="ctr">
@@ -6209,6 +6242,29 @@
                         <a:t>ESCRIBIR(X)</a:t>
                       </a:r>
                     </a:p>
+                    <a:p>
+                      <a:pPr marL="0" marR="0" lvl="0" indent="0" algn="ctr" defTabSz="457200" rtl="0" eaLnBrk="1" fontAlgn="auto" latinLnBrk="0" hangingPunct="1">
+                        <a:lnSpc>
+                          <a:spcPct val="100000"/>
+                        </a:lnSpc>
+                        <a:spcBef>
+                          <a:spcPts val="0"/>
+                        </a:spcBef>
+                        <a:spcAft>
+                          <a:spcPts val="0"/>
+                        </a:spcAft>
+                        <a:buClrTx/>
+                        <a:buSzTx/>
+                        <a:buFontTx/>
+                        <a:buNone/>
+                        <a:tabLst/>
+                        <a:defRPr/>
+                      </a:pPr>
+                      <a:r>
+                        <a:rPr lang="es-CL" sz="2400" dirty="0"/>
+                        <a:t>COMMIT</a:t>
+                      </a:r>
+                    </a:p>
                   </a:txBody>
                   <a:tcPr anchor="ctr">
                     <a:lnL w="12700" cap="flat" cmpd="sng" algn="ctr">
@@ -6246,7 +6302,7 @@
         </p:nvSpPr>
         <p:spPr>
           <a:xfrm rot="20938212">
-            <a:off x="5657319" y="4750261"/>
+            <a:off x="6183790" y="5054376"/>
             <a:ext cx="3662217" cy="1271335"/>
           </a:xfrm>
           <a:prstGeom prst="rect">
@@ -6533,7 +6589,15 @@
             </a:pPr>
             <a:r>
               <a:rPr lang="es-CL" sz="3600" dirty="0"/>
-              <a:t>Lo ideal sería procesar una transacción a la vez, pero como no es posible, tenemos que ejecutar concurrentemente tratando que sean lógicamente equivalentes a un orden secuencial</a:t>
+              <a:t>Lo ideal sería procesar una transacción a la vez, pero como no es posible, tenemos que ejecutar concurrentemente tratando que sean lógicamente </a:t>
+            </a:r>
+            <a:r>
+              <a:rPr lang="es-CL" sz="3600" b="1" dirty="0"/>
+              <a:t>equivalentes</a:t>
+            </a:r>
+            <a:r>
+              <a:rPr lang="es-CL" sz="3600" dirty="0"/>
+              <a:t> a un plan secuencial</a:t>
             </a:r>
           </a:p>
         </p:txBody>
@@ -6674,6 +6738,120 @@
           <p:cNvPr id="2" name="Título 1">
             <a:extLst>
               <a:ext uri="{FF2B5EF4-FFF2-40B4-BE49-F238E27FC236}">
+                <a16:creationId xmlns:a16="http://schemas.microsoft.com/office/drawing/2014/main" id="{BA65D5F0-6620-40D1-A5C5-BDC05A7634C4}"/>
+              </a:ext>
+            </a:extLst>
+          </p:cNvPr>
+          <p:cNvSpPr>
+            <a:spLocks noGrp="1"/>
+          </p:cNvSpPr>
+          <p:nvPr>
+            <p:ph type="title"/>
+          </p:nvPr>
+        </p:nvSpPr>
+        <p:spPr/>
+        <p:txBody>
+          <a:bodyPr/>
+          <a:lstStyle/>
+          <a:p>
+            <a:r>
+              <a:rPr lang="es-CL" sz="4000" dirty="0">
+                <a:solidFill>
+                  <a:prstClr val="white"/>
+                </a:solidFill>
+              </a:rPr>
+              <a:t>Equivalencia de Planes</a:t>
+            </a:r>
+            <a:endParaRPr lang="es-CL" dirty="0"/>
+          </a:p>
+        </p:txBody>
+      </p:sp>
+      <p:sp>
+        <p:nvSpPr>
+          <p:cNvPr id="3" name="Marcador de contenido 2">
+            <a:extLst>
+              <a:ext uri="{FF2B5EF4-FFF2-40B4-BE49-F238E27FC236}">
+                <a16:creationId xmlns:a16="http://schemas.microsoft.com/office/drawing/2014/main" id="{B48EA0B4-F286-4C02-8EFA-BAD0896E7BCC}"/>
+              </a:ext>
+            </a:extLst>
+          </p:cNvPr>
+          <p:cNvSpPr>
+            <a:spLocks noGrp="1"/>
+          </p:cNvSpPr>
+          <p:nvPr>
+            <p:ph idx="1"/>
+          </p:nvPr>
+        </p:nvSpPr>
+        <p:spPr/>
+        <p:txBody>
+          <a:bodyPr>
+            <a:normAutofit/>
+          </a:bodyPr>
+          <a:lstStyle/>
+          <a:p>
+            <a:r>
+              <a:rPr lang="es-CL" sz="2800" dirty="0"/>
+              <a:t>Hay distintos criterios para definir que dos planes son equivalentes:</a:t>
+            </a:r>
+          </a:p>
+          <a:p>
+            <a:pPr lvl="1"/>
+            <a:r>
+              <a:rPr lang="es-CL" sz="2400" dirty="0"/>
+              <a:t>Equivalencia por Resultado</a:t>
+            </a:r>
+          </a:p>
+          <a:p>
+            <a:pPr lvl="1"/>
+            <a:r>
+              <a:rPr lang="es-CL" sz="2400" dirty="0"/>
+              <a:t>Equivalencia por Vista</a:t>
+            </a:r>
+          </a:p>
+          <a:p>
+            <a:pPr lvl="1"/>
+            <a:r>
+              <a:rPr lang="es-CL" sz="2400" dirty="0"/>
+              <a:t>Equivalencia por Conflicto</a:t>
+            </a:r>
+          </a:p>
+        </p:txBody>
+      </p:sp>
+    </p:spTree>
+    <p:extLst>
+      <p:ext uri="{BB962C8B-B14F-4D97-AF65-F5344CB8AC3E}">
+        <p14:creationId xmlns:p14="http://schemas.microsoft.com/office/powerpoint/2010/main" val="2118424989"/>
+      </p:ext>
+    </p:extLst>
+  </p:cSld>
+  <p:clrMapOvr>
+    <a:masterClrMapping/>
+  </p:clrMapOvr>
+</p:sld>
+</file>
+
+<file path=ppt/slides/slide21.xml><?xml version="1.0" encoding="utf-8"?>
+<p:sld xmlns:a="http://schemas.openxmlformats.org/drawingml/2006/main" xmlns:r="http://schemas.openxmlformats.org/officeDocument/2006/relationships" xmlns:p="http://schemas.openxmlformats.org/presentationml/2006/main">
+  <p:cSld>
+    <p:spTree>
+      <p:nvGrpSpPr>
+        <p:cNvPr id="1" name=""/>
+        <p:cNvGrpSpPr/>
+        <p:nvPr/>
+      </p:nvGrpSpPr>
+      <p:grpSpPr>
+        <a:xfrm>
+          <a:off x="0" y="0"/>
+          <a:ext cx="0" cy="0"/>
+          <a:chOff x="0" y="0"/>
+          <a:chExt cx="0" cy="0"/>
+        </a:xfrm>
+      </p:grpSpPr>
+      <p:sp>
+        <p:nvSpPr>
+          <p:cNvPr id="2" name="Título 1">
+            <a:extLst>
+              <a:ext uri="{FF2B5EF4-FFF2-40B4-BE49-F238E27FC236}">
                 <a16:creationId xmlns:a16="http://schemas.microsoft.com/office/drawing/2014/main" id="{191C8431-6870-4CC6-8136-71B453CE80B1}"/>
               </a:ext>
             </a:extLst>
@@ -6699,8 +6877,8 @@
           </a:p>
         </p:txBody>
       </p:sp>
-      <mc:AlternateContent xmlns:mc="http://schemas.openxmlformats.org/markup-compatibility/2006">
-        <mc:Choice xmlns:a14="http://schemas.microsoft.com/office/drawing/2010/main" Requires="a14">
+      <mc:AlternateContent xmlns:mc="http://schemas.openxmlformats.org/markup-compatibility/2006" xmlns:a14="http://schemas.microsoft.com/office/drawing/2010/main">
+        <mc:Choice Requires="a14">
           <p:sp>
             <p:nvSpPr>
               <p:cNvPr id="3" name="Marcador de contenido 2">
@@ -6809,7 +6987,7 @@
             </p:txBody>
           </p:sp>
         </mc:Choice>
-        <mc:Fallback>
+        <mc:Fallback xmlns="">
           <p:sp>
             <p:nvSpPr>
               <p:cNvPr id="3" name="Marcador de contenido 2">
@@ -6862,115 +7040,6 @@
 </p:sld>
 </file>
 
-<file path=ppt/slides/slide21.xml><?xml version="1.0" encoding="utf-8"?>
-<p:sld xmlns:a="http://schemas.openxmlformats.org/drawingml/2006/main" xmlns:r="http://schemas.openxmlformats.org/officeDocument/2006/relationships" xmlns:p="http://schemas.openxmlformats.org/presentationml/2006/main">
-  <p:cSld>
-    <p:spTree>
-      <p:nvGrpSpPr>
-        <p:cNvPr id="1" name=""/>
-        <p:cNvGrpSpPr/>
-        <p:nvPr/>
-      </p:nvGrpSpPr>
-      <p:grpSpPr>
-        <a:xfrm>
-          <a:off x="0" y="0"/>
-          <a:ext cx="0" cy="0"/>
-          <a:chOff x="0" y="0"/>
-          <a:chExt cx="0" cy="0"/>
-        </a:xfrm>
-      </p:grpSpPr>
-      <p:sp>
-        <p:nvSpPr>
-          <p:cNvPr id="2" name="Título 1">
-            <a:extLst>
-              <a:ext uri="{FF2B5EF4-FFF2-40B4-BE49-F238E27FC236}">
-                <a16:creationId xmlns:a16="http://schemas.microsoft.com/office/drawing/2014/main" id="{191C8431-6870-4CC6-8136-71B453CE80B1}"/>
-              </a:ext>
-            </a:extLst>
-          </p:cNvPr>
-          <p:cNvSpPr>
-            <a:spLocks noGrp="1"/>
-          </p:cNvSpPr>
-          <p:nvPr>
-            <p:ph type="title"/>
-          </p:nvPr>
-        </p:nvSpPr>
-        <p:spPr/>
-        <p:txBody>
-          <a:bodyPr>
-            <a:normAutofit/>
-          </a:bodyPr>
-          <a:lstStyle/>
-          <a:p>
-            <a:r>
-              <a:rPr lang="es-CL" sz="4000" dirty="0" err="1"/>
-              <a:t>Serializabilidad</a:t>
-            </a:r>
-            <a:r>
-              <a:rPr lang="es-CL" sz="4000" dirty="0"/>
-              <a:t> por resultado</a:t>
-            </a:r>
-          </a:p>
-        </p:txBody>
-      </p:sp>
-      <p:sp>
-        <p:nvSpPr>
-          <p:cNvPr id="3" name="Marcador de contenido 2">
-            <a:extLst>
-              <a:ext uri="{FF2B5EF4-FFF2-40B4-BE49-F238E27FC236}">
-                <a16:creationId xmlns:a16="http://schemas.microsoft.com/office/drawing/2014/main" id="{2C41A32E-FCB9-4FF3-935B-4E570DC042B3}"/>
-              </a:ext>
-            </a:extLst>
-          </p:cNvPr>
-          <p:cNvSpPr>
-            <a:spLocks noGrp="1"/>
-          </p:cNvSpPr>
-          <p:nvPr>
-            <p:ph idx="1"/>
-          </p:nvPr>
-        </p:nvSpPr>
-        <p:spPr/>
-        <p:txBody>
-          <a:bodyPr>
-            <a:normAutofit/>
-          </a:bodyPr>
-          <a:lstStyle/>
-          <a:p>
-            <a:pPr marL="0" indent="0" algn="ctr">
-              <a:buNone/>
-            </a:pPr>
-            <a:r>
-              <a:rPr lang="es-CL" sz="3600" dirty="0"/>
-              <a:t>Un plan es </a:t>
-            </a:r>
-            <a:r>
-              <a:rPr lang="es-CL" sz="3600" i="1" dirty="0" err="1"/>
-              <a:t>serializable</a:t>
-            </a:r>
-            <a:r>
-              <a:rPr lang="es-CL" sz="3600" i="1" dirty="0"/>
-              <a:t> por resultado</a:t>
-            </a:r>
-            <a:r>
-              <a:rPr lang="es-CL" sz="3600" dirty="0"/>
-              <a:t> si es equivalente por resultado a una planificación serial</a:t>
-            </a:r>
-          </a:p>
-        </p:txBody>
-      </p:sp>
-    </p:spTree>
-    <p:extLst>
-      <p:ext uri="{BB962C8B-B14F-4D97-AF65-F5344CB8AC3E}">
-        <p14:creationId xmlns:p14="http://schemas.microsoft.com/office/powerpoint/2010/main" val="3835329240"/>
-      </p:ext>
-    </p:extLst>
-  </p:cSld>
-  <p:clrMapOvr>
-    <a:masterClrMapping/>
-  </p:clrMapOvr>
-</p:sld>
-</file>
-
 <file path=ppt/slides/slide22.xml><?xml version="1.0" encoding="utf-8"?>
 <p:sld xmlns:a="http://schemas.openxmlformats.org/drawingml/2006/main" xmlns:r="http://schemas.openxmlformats.org/officeDocument/2006/relationships" xmlns:p="http://schemas.openxmlformats.org/presentationml/2006/main">
   <p:cSld>
@@ -7012,14 +7081,123 @@
           <a:lstStyle/>
           <a:p>
             <a:r>
+              <a:rPr lang="es-CL" sz="4000" dirty="0" err="1"/>
+              <a:t>Serializabilidad</a:t>
+            </a:r>
+            <a:r>
+              <a:rPr lang="es-CL" sz="4000" dirty="0"/>
+              <a:t> por resultado</a:t>
+            </a:r>
+          </a:p>
+        </p:txBody>
+      </p:sp>
+      <p:sp>
+        <p:nvSpPr>
+          <p:cNvPr id="3" name="Marcador de contenido 2">
+            <a:extLst>
+              <a:ext uri="{FF2B5EF4-FFF2-40B4-BE49-F238E27FC236}">
+                <a16:creationId xmlns:a16="http://schemas.microsoft.com/office/drawing/2014/main" id="{2C41A32E-FCB9-4FF3-935B-4E570DC042B3}"/>
+              </a:ext>
+            </a:extLst>
+          </p:cNvPr>
+          <p:cNvSpPr>
+            <a:spLocks noGrp="1"/>
+          </p:cNvSpPr>
+          <p:nvPr>
+            <p:ph idx="1"/>
+          </p:nvPr>
+        </p:nvSpPr>
+        <p:spPr/>
+        <p:txBody>
+          <a:bodyPr>
+            <a:normAutofit/>
+          </a:bodyPr>
+          <a:lstStyle/>
+          <a:p>
+            <a:pPr marL="0" indent="0" algn="ctr">
+              <a:buNone/>
+            </a:pPr>
+            <a:r>
+              <a:rPr lang="es-CL" sz="3600" dirty="0"/>
+              <a:t>Un plan es </a:t>
+            </a:r>
+            <a:r>
+              <a:rPr lang="es-CL" sz="3600" i="1" dirty="0" err="1"/>
+              <a:t>serializable</a:t>
+            </a:r>
+            <a:r>
+              <a:rPr lang="es-CL" sz="3600" i="1" dirty="0"/>
+              <a:t> por resultado</a:t>
+            </a:r>
+            <a:r>
+              <a:rPr lang="es-CL" sz="3600" dirty="0"/>
+              <a:t> si es equivalente por resultado a una planificación serial</a:t>
+            </a:r>
+          </a:p>
+        </p:txBody>
+      </p:sp>
+    </p:spTree>
+    <p:extLst>
+      <p:ext uri="{BB962C8B-B14F-4D97-AF65-F5344CB8AC3E}">
+        <p14:creationId xmlns:p14="http://schemas.microsoft.com/office/powerpoint/2010/main" val="3835329240"/>
+      </p:ext>
+    </p:extLst>
+  </p:cSld>
+  <p:clrMapOvr>
+    <a:masterClrMapping/>
+  </p:clrMapOvr>
+</p:sld>
+</file>
+
+<file path=ppt/slides/slide23.xml><?xml version="1.0" encoding="utf-8"?>
+<p:sld xmlns:a="http://schemas.openxmlformats.org/drawingml/2006/main" xmlns:r="http://schemas.openxmlformats.org/officeDocument/2006/relationships" xmlns:p="http://schemas.openxmlformats.org/presentationml/2006/main">
+  <p:cSld>
+    <p:spTree>
+      <p:nvGrpSpPr>
+        <p:cNvPr id="1" name=""/>
+        <p:cNvGrpSpPr/>
+        <p:nvPr/>
+      </p:nvGrpSpPr>
+      <p:grpSpPr>
+        <a:xfrm>
+          <a:off x="0" y="0"/>
+          <a:ext cx="0" cy="0"/>
+          <a:chOff x="0" y="0"/>
+          <a:chExt cx="0" cy="0"/>
+        </a:xfrm>
+      </p:grpSpPr>
+      <p:sp>
+        <p:nvSpPr>
+          <p:cNvPr id="2" name="Título 1">
+            <a:extLst>
+              <a:ext uri="{FF2B5EF4-FFF2-40B4-BE49-F238E27FC236}">
+                <a16:creationId xmlns:a16="http://schemas.microsoft.com/office/drawing/2014/main" id="{191C8431-6870-4CC6-8136-71B453CE80B1}"/>
+              </a:ext>
+            </a:extLst>
+          </p:cNvPr>
+          <p:cNvSpPr>
+            <a:spLocks noGrp="1"/>
+          </p:cNvSpPr>
+          <p:nvPr>
+            <p:ph type="title"/>
+          </p:nvPr>
+        </p:nvSpPr>
+        <p:spPr/>
+        <p:txBody>
+          <a:bodyPr>
+            <a:normAutofit/>
+          </a:bodyPr>
+          <a:lstStyle/>
+          <a:p>
+            <a:r>
               <a:rPr lang="es-CL" sz="4000" dirty="0"/>
               <a:t>Equivalencia por conflicto</a:t>
             </a:r>
           </a:p>
         </p:txBody>
       </p:sp>
-      <mc:AlternateContent xmlns:mc="http://schemas.openxmlformats.org/markup-compatibility/2006">
-        <mc:Choice xmlns:a14="http://schemas.microsoft.com/office/drawing/2010/main" Requires="a14">
+      <mc:AlternateContent xmlns:mc="http://schemas.openxmlformats.org/markup-compatibility/2006" xmlns:a14="http://schemas.microsoft.com/office/drawing/2010/main">
+        <mc:Choice Requires="a14">
           <p:sp>
             <p:nvSpPr>
               <p:cNvPr id="3" name="Marcador de contenido 2">
@@ -7114,13 +7292,13 @@
                 </a14:m>
                 <a:r>
                   <a:rPr lang="es-CL" sz="3600" dirty="0"/>
-                  <a:t> son equivalentes por conflicto ambas tienen el mismo conjunto de operaciones conflictivas</a:t>
+                  <a:t> son equivalentes por conflicto si ambas tienen el mismo conjunto de operaciones conflictivas</a:t>
                 </a:r>
               </a:p>
             </p:txBody>
           </p:sp>
         </mc:Choice>
-        <mc:Fallback>
+        <mc:Fallback xmlns="">
           <p:sp>
             <p:nvSpPr>
               <p:cNvPr id="3" name="Marcador de contenido 2">
@@ -7141,7 +7319,7 @@
               <a:blipFill>
                 <a:blip r:embed="rId2"/>
                 <a:stretch>
-                  <a:fillRect r="-608"/>
+                  <a:fillRect l="-1326" r="-2431"/>
                 </a:stretch>
               </a:blipFill>
             </p:spPr>
@@ -7173,7 +7351,7 @@
 </p:sld>
 </file>
 
-<file path=ppt/slides/slide23.xml><?xml version="1.0" encoding="utf-8"?>
+<file path=ppt/slides/slide24.xml><?xml version="1.0" encoding="utf-8"?>
 <p:sld xmlns:a="http://schemas.openxmlformats.org/drawingml/2006/main" xmlns:r="http://schemas.openxmlformats.org/officeDocument/2006/relationships" xmlns:p="http://schemas.openxmlformats.org/presentationml/2006/main">
   <p:cSld>
     <p:spTree>
@@ -7278,7 +7456,7 @@
 </p:sld>
 </file>
 
-<file path=ppt/slides/slide24.xml><?xml version="1.0" encoding="utf-8"?>
+<file path=ppt/slides/slide25.xml><?xml version="1.0" encoding="utf-8"?>
 <p:sld xmlns:a="http://schemas.openxmlformats.org/drawingml/2006/main" xmlns:r="http://schemas.openxmlformats.org/officeDocument/2006/relationships" xmlns:p="http://schemas.openxmlformats.org/presentationml/2006/main">
   <p:cSld>
     <p:spTree>
@@ -7926,7 +8104,7 @@
 </p:sld>
 </file>
 
-<file path=ppt/slides/slide25.xml><?xml version="1.0" encoding="utf-8"?>
+<file path=ppt/slides/slide26.xml><?xml version="1.0" encoding="utf-8"?>
 <p:sld xmlns:a="http://schemas.openxmlformats.org/drawingml/2006/main" xmlns:r="http://schemas.openxmlformats.org/officeDocument/2006/relationships" xmlns:p="http://schemas.openxmlformats.org/presentationml/2006/main">
   <p:cSld>
     <p:spTree>
@@ -7973,8 +8151,8 @@
           </a:p>
         </p:txBody>
       </p:sp>
-      <mc:AlternateContent xmlns:mc="http://schemas.openxmlformats.org/markup-compatibility/2006">
-        <mc:Choice xmlns:a14="http://schemas.microsoft.com/office/drawing/2010/main" Requires="a14">
+      <mc:AlternateContent xmlns:mc="http://schemas.openxmlformats.org/markup-compatibility/2006" xmlns:a14="http://schemas.microsoft.com/office/drawing/2010/main">
+        <mc:Choice Requires="a14">
           <p:sp>
             <p:nvSpPr>
               <p:cNvPr id="3" name="Marcador de contenido 2">
@@ -8459,7 +8637,7 @@
             </p:txBody>
           </p:sp>
         </mc:Choice>
-        <mc:Fallback>
+        <mc:Fallback xmlns="">
           <p:sp>
             <p:nvSpPr>
               <p:cNvPr id="3" name="Marcador de contenido 2">
@@ -8516,111 +8694,6 @@
 </p:sld>
 </file>
 
-<file path=ppt/slides/slide26.xml><?xml version="1.0" encoding="utf-8"?>
-<p:sld xmlns:a="http://schemas.openxmlformats.org/drawingml/2006/main" xmlns:r="http://schemas.openxmlformats.org/officeDocument/2006/relationships" xmlns:p="http://schemas.openxmlformats.org/presentationml/2006/main">
-  <p:cSld>
-    <p:spTree>
-      <p:nvGrpSpPr>
-        <p:cNvPr id="1" name=""/>
-        <p:cNvGrpSpPr/>
-        <p:nvPr/>
-      </p:nvGrpSpPr>
-      <p:grpSpPr>
-        <a:xfrm>
-          <a:off x="0" y="0"/>
-          <a:ext cx="0" cy="0"/>
-          <a:chOff x="0" y="0"/>
-          <a:chExt cx="0" cy="0"/>
-        </a:xfrm>
-      </p:grpSpPr>
-      <p:sp>
-        <p:nvSpPr>
-          <p:cNvPr id="2" name="Título 1">
-            <a:extLst>
-              <a:ext uri="{FF2B5EF4-FFF2-40B4-BE49-F238E27FC236}">
-                <a16:creationId xmlns:a16="http://schemas.microsoft.com/office/drawing/2014/main" id="{191C8431-6870-4CC6-8136-71B453CE80B1}"/>
-              </a:ext>
-            </a:extLst>
-          </p:cNvPr>
-          <p:cNvSpPr>
-            <a:spLocks noGrp="1"/>
-          </p:cNvSpPr>
-          <p:nvPr>
-            <p:ph type="title"/>
-          </p:nvPr>
-        </p:nvSpPr>
-        <p:spPr/>
-        <p:txBody>
-          <a:bodyPr>
-            <a:normAutofit/>
-          </a:bodyPr>
-          <a:lstStyle/>
-          <a:p>
-            <a:r>
-              <a:rPr lang="es-CL" sz="4000" dirty="0" err="1"/>
-              <a:t>serializabilidad</a:t>
-            </a:r>
-            <a:r>
-              <a:rPr lang="es-CL" sz="4000" dirty="0"/>
-              <a:t> por Vista</a:t>
-            </a:r>
-          </a:p>
-        </p:txBody>
-      </p:sp>
-      <p:sp>
-        <p:nvSpPr>
-          <p:cNvPr id="3" name="Marcador de contenido 2">
-            <a:extLst>
-              <a:ext uri="{FF2B5EF4-FFF2-40B4-BE49-F238E27FC236}">
-                <a16:creationId xmlns:a16="http://schemas.microsoft.com/office/drawing/2014/main" id="{2C41A32E-FCB9-4FF3-935B-4E570DC042B3}"/>
-              </a:ext>
-            </a:extLst>
-          </p:cNvPr>
-          <p:cNvSpPr>
-            <a:spLocks noGrp="1"/>
-          </p:cNvSpPr>
-          <p:nvPr>
-            <p:ph idx="1"/>
-          </p:nvPr>
-        </p:nvSpPr>
-        <p:spPr/>
-        <p:txBody>
-          <a:bodyPr>
-            <a:normAutofit/>
-          </a:bodyPr>
-          <a:lstStyle/>
-          <a:p>
-            <a:pPr marL="0" indent="0" algn="ctr">
-              <a:buNone/>
-            </a:pPr>
-            <a:r>
-              <a:rPr lang="es-CL" sz="3600" dirty="0"/>
-              <a:t>Un plan es </a:t>
-            </a:r>
-            <a:r>
-              <a:rPr lang="es-CL" sz="3600" dirty="0" err="1"/>
-              <a:t>serializable</a:t>
-            </a:r>
-            <a:r>
-              <a:rPr lang="es-CL" sz="3600" dirty="0"/>
-              <a:t> por vista si es equivalente por vista a una planificación serial</a:t>
-            </a:r>
-          </a:p>
-        </p:txBody>
-      </p:sp>
-    </p:spTree>
-    <p:extLst>
-      <p:ext uri="{BB962C8B-B14F-4D97-AF65-F5344CB8AC3E}">
-        <p14:creationId xmlns:p14="http://schemas.microsoft.com/office/powerpoint/2010/main" val="3327728170"/>
-      </p:ext>
-    </p:extLst>
-  </p:cSld>
-  <p:clrMapOvr>
-    <a:masterClrMapping/>
-  </p:clrMapOvr>
-</p:sld>
-</file>
-
 <file path=ppt/slides/slide27.xml><?xml version="1.0" encoding="utf-8"?>
 <p:sld xmlns:a="http://schemas.openxmlformats.org/drawingml/2006/main" xmlns:r="http://schemas.openxmlformats.org/officeDocument/2006/relationships" xmlns:p="http://schemas.openxmlformats.org/presentationml/2006/main">
   <p:cSld>
@@ -8688,6 +8761,111 @@
             <p:ph idx="1"/>
           </p:nvPr>
         </p:nvSpPr>
+        <p:spPr/>
+        <p:txBody>
+          <a:bodyPr>
+            <a:normAutofit/>
+          </a:bodyPr>
+          <a:lstStyle/>
+          <a:p>
+            <a:pPr marL="0" indent="0" algn="ctr">
+              <a:buNone/>
+            </a:pPr>
+            <a:r>
+              <a:rPr lang="es-CL" sz="3600" dirty="0"/>
+              <a:t>Un plan es </a:t>
+            </a:r>
+            <a:r>
+              <a:rPr lang="es-CL" sz="3600" dirty="0" err="1"/>
+              <a:t>serializable</a:t>
+            </a:r>
+            <a:r>
+              <a:rPr lang="es-CL" sz="3600" dirty="0"/>
+              <a:t> por vista si es equivalente por vista a una planificación serial</a:t>
+            </a:r>
+          </a:p>
+        </p:txBody>
+      </p:sp>
+    </p:spTree>
+    <p:extLst>
+      <p:ext uri="{BB962C8B-B14F-4D97-AF65-F5344CB8AC3E}">
+        <p14:creationId xmlns:p14="http://schemas.microsoft.com/office/powerpoint/2010/main" val="3327728170"/>
+      </p:ext>
+    </p:extLst>
+  </p:cSld>
+  <p:clrMapOvr>
+    <a:masterClrMapping/>
+  </p:clrMapOvr>
+</p:sld>
+</file>
+
+<file path=ppt/slides/slide28.xml><?xml version="1.0" encoding="utf-8"?>
+<p:sld xmlns:a="http://schemas.openxmlformats.org/drawingml/2006/main" xmlns:r="http://schemas.openxmlformats.org/officeDocument/2006/relationships" xmlns:p="http://schemas.openxmlformats.org/presentationml/2006/main">
+  <p:cSld>
+    <p:spTree>
+      <p:nvGrpSpPr>
+        <p:cNvPr id="1" name=""/>
+        <p:cNvGrpSpPr/>
+        <p:nvPr/>
+      </p:nvGrpSpPr>
+      <p:grpSpPr>
+        <a:xfrm>
+          <a:off x="0" y="0"/>
+          <a:ext cx="0" cy="0"/>
+          <a:chOff x="0" y="0"/>
+          <a:chExt cx="0" cy="0"/>
+        </a:xfrm>
+      </p:grpSpPr>
+      <p:sp>
+        <p:nvSpPr>
+          <p:cNvPr id="2" name="Título 1">
+            <a:extLst>
+              <a:ext uri="{FF2B5EF4-FFF2-40B4-BE49-F238E27FC236}">
+                <a16:creationId xmlns:a16="http://schemas.microsoft.com/office/drawing/2014/main" id="{191C8431-6870-4CC6-8136-71B453CE80B1}"/>
+              </a:ext>
+            </a:extLst>
+          </p:cNvPr>
+          <p:cNvSpPr>
+            <a:spLocks noGrp="1"/>
+          </p:cNvSpPr>
+          <p:nvPr>
+            <p:ph type="title"/>
+          </p:nvPr>
+        </p:nvSpPr>
+        <p:spPr/>
+        <p:txBody>
+          <a:bodyPr>
+            <a:normAutofit/>
+          </a:bodyPr>
+          <a:lstStyle/>
+          <a:p>
+            <a:r>
+              <a:rPr lang="es-CL" sz="4000" dirty="0" err="1"/>
+              <a:t>serializabilidad</a:t>
+            </a:r>
+            <a:r>
+              <a:rPr lang="es-CL" sz="4000" dirty="0"/>
+              <a:t> por Vista</a:t>
+            </a:r>
+          </a:p>
+        </p:txBody>
+      </p:sp>
+      <p:sp>
+        <p:nvSpPr>
+          <p:cNvPr id="3" name="Marcador de contenido 2">
+            <a:extLst>
+              <a:ext uri="{FF2B5EF4-FFF2-40B4-BE49-F238E27FC236}">
+                <a16:creationId xmlns:a16="http://schemas.microsoft.com/office/drawing/2014/main" id="{2C41A32E-FCB9-4FF3-935B-4E570DC042B3}"/>
+              </a:ext>
+            </a:extLst>
+          </p:cNvPr>
+          <p:cNvSpPr>
+            <a:spLocks noGrp="1"/>
+          </p:cNvSpPr>
+          <p:nvPr>
+            <p:ph idx="1"/>
+          </p:nvPr>
+        </p:nvSpPr>
         <p:spPr>
           <a:xfrm>
             <a:off x="304800" y="2180496"/>
@@ -8739,7 +8917,7 @@
 </p:sld>
 </file>
 
-<file path=ppt/slides/slide28.xml><?xml version="1.0" encoding="utf-8"?>
+<file path=ppt/slides/slide29.xml><?xml version="1.0" encoding="utf-8"?>
 <p:sld xmlns:a="http://schemas.openxmlformats.org/drawingml/2006/main" xmlns:r="http://schemas.openxmlformats.org/officeDocument/2006/relationships" xmlns:p="http://schemas.openxmlformats.org/presentationml/2006/main">
   <p:cSld>
     <p:spTree>
@@ -9382,119 +9560,6 @@
 </p:sld>
 </file>
 
-<file path=ppt/slides/slide29.xml><?xml version="1.0" encoding="utf-8"?>
-<p:sld xmlns:a="http://schemas.openxmlformats.org/drawingml/2006/main" xmlns:r="http://schemas.openxmlformats.org/officeDocument/2006/relationships" xmlns:p="http://schemas.openxmlformats.org/presentationml/2006/main">
-  <p:cSld>
-    <p:spTree>
-      <p:nvGrpSpPr>
-        <p:cNvPr id="1" name=""/>
-        <p:cNvGrpSpPr/>
-        <p:nvPr/>
-      </p:nvGrpSpPr>
-      <p:grpSpPr>
-        <a:xfrm>
-          <a:off x="0" y="0"/>
-          <a:ext cx="0" cy="0"/>
-          <a:chOff x="0" y="0"/>
-          <a:chExt cx="0" cy="0"/>
-        </a:xfrm>
-      </p:grpSpPr>
-      <p:sp>
-        <p:nvSpPr>
-          <p:cNvPr id="2" name="Título 1">
-            <a:extLst>
-              <a:ext uri="{FF2B5EF4-FFF2-40B4-BE49-F238E27FC236}">
-                <a16:creationId xmlns:a16="http://schemas.microsoft.com/office/drawing/2014/main" id="{191C8431-6870-4CC6-8136-71B453CE80B1}"/>
-              </a:ext>
-            </a:extLst>
-          </p:cNvPr>
-          <p:cNvSpPr>
-            <a:spLocks noGrp="1"/>
-          </p:cNvSpPr>
-          <p:nvPr>
-            <p:ph type="title"/>
-          </p:nvPr>
-        </p:nvSpPr>
-        <p:spPr/>
-        <p:txBody>
-          <a:bodyPr>
-            <a:normAutofit/>
-          </a:bodyPr>
-          <a:lstStyle/>
-          <a:p>
-            <a:r>
-              <a:rPr lang="es-CL" sz="4000" dirty="0" err="1"/>
-              <a:t>serializabilidad</a:t>
-            </a:r>
-            <a:r>
-              <a:rPr lang="es-CL" sz="4000" dirty="0"/>
-              <a:t> por conflicto</a:t>
-            </a:r>
-          </a:p>
-        </p:txBody>
-      </p:sp>
-      <p:sp>
-        <p:nvSpPr>
-          <p:cNvPr id="3" name="Marcador de contenido 2">
-            <a:extLst>
-              <a:ext uri="{FF2B5EF4-FFF2-40B4-BE49-F238E27FC236}">
-                <a16:creationId xmlns:a16="http://schemas.microsoft.com/office/drawing/2014/main" id="{2C41A32E-FCB9-4FF3-935B-4E570DC042B3}"/>
-              </a:ext>
-            </a:extLst>
-          </p:cNvPr>
-          <p:cNvSpPr>
-            <a:spLocks noGrp="1"/>
-          </p:cNvSpPr>
-          <p:nvPr>
-            <p:ph idx="1"/>
-          </p:nvPr>
-        </p:nvSpPr>
-        <p:spPr/>
-        <p:txBody>
-          <a:bodyPr>
-            <a:normAutofit/>
-          </a:bodyPr>
-          <a:lstStyle/>
-          <a:p>
-            <a:pPr marL="0" indent="0" algn="ctr">
-              <a:buNone/>
-            </a:pPr>
-            <a:r>
-              <a:rPr lang="es-CL" sz="3600" dirty="0"/>
-              <a:t>La mayoría de los SABD usan </a:t>
-            </a:r>
-            <a:r>
-              <a:rPr lang="es-CL" sz="3600" dirty="0" err="1"/>
-              <a:t>serializabilidad</a:t>
-            </a:r>
-            <a:r>
-              <a:rPr lang="es-CL" sz="3600" dirty="0"/>
-              <a:t> por conflicto. ¿Cómo saber si un plan es </a:t>
-            </a:r>
-            <a:r>
-              <a:rPr lang="es-CL" sz="3600" dirty="0" err="1"/>
-              <a:t>serializable</a:t>
-            </a:r>
-            <a:r>
-              <a:rPr lang="es-CL" sz="3600" dirty="0"/>
-              <a:t> por conflicto?</a:t>
-            </a:r>
-          </a:p>
-        </p:txBody>
-      </p:sp>
-    </p:spTree>
-    <p:extLst>
-      <p:ext uri="{BB962C8B-B14F-4D97-AF65-F5344CB8AC3E}">
-        <p14:creationId xmlns:p14="http://schemas.microsoft.com/office/powerpoint/2010/main" val="3069932161"/>
-      </p:ext>
-    </p:extLst>
-  </p:cSld>
-  <p:clrMapOvr>
-    <a:masterClrMapping/>
-  </p:clrMapOvr>
-</p:sld>
-</file>
-
 <file path=ppt/slides/slide3.xml><?xml version="1.0" encoding="utf-8"?>
 <p:sld xmlns:a="http://schemas.openxmlformats.org/drawingml/2006/main" xmlns:r="http://schemas.openxmlformats.org/officeDocument/2006/relationships" xmlns:p="http://schemas.openxmlformats.org/presentationml/2006/main">
   <p:cSld>
@@ -9629,14 +9694,127 @@
           <a:lstStyle/>
           <a:p>
             <a:r>
+              <a:rPr lang="es-CL" sz="4000" dirty="0" err="1"/>
+              <a:t>serializabilidad</a:t>
+            </a:r>
+            <a:r>
+              <a:rPr lang="es-CL" sz="4000" dirty="0"/>
+              <a:t> por conflicto</a:t>
+            </a:r>
+          </a:p>
+        </p:txBody>
+      </p:sp>
+      <p:sp>
+        <p:nvSpPr>
+          <p:cNvPr id="3" name="Marcador de contenido 2">
+            <a:extLst>
+              <a:ext uri="{FF2B5EF4-FFF2-40B4-BE49-F238E27FC236}">
+                <a16:creationId xmlns:a16="http://schemas.microsoft.com/office/drawing/2014/main" id="{2C41A32E-FCB9-4FF3-935B-4E570DC042B3}"/>
+              </a:ext>
+            </a:extLst>
+          </p:cNvPr>
+          <p:cNvSpPr>
+            <a:spLocks noGrp="1"/>
+          </p:cNvSpPr>
+          <p:nvPr>
+            <p:ph idx="1"/>
+          </p:nvPr>
+        </p:nvSpPr>
+        <p:spPr/>
+        <p:txBody>
+          <a:bodyPr>
+            <a:normAutofit/>
+          </a:bodyPr>
+          <a:lstStyle/>
+          <a:p>
+            <a:pPr marL="0" indent="0" algn="ctr">
+              <a:buNone/>
+            </a:pPr>
+            <a:r>
+              <a:rPr lang="es-CL" sz="3600" dirty="0"/>
+              <a:t>La mayoría de los SABD usan </a:t>
+            </a:r>
+            <a:r>
+              <a:rPr lang="es-CL" sz="3600" dirty="0" err="1"/>
+              <a:t>serializabilidad</a:t>
+            </a:r>
+            <a:r>
+              <a:rPr lang="es-CL" sz="3600" dirty="0"/>
+              <a:t> por conflicto. ¿Cómo saber si un plan es </a:t>
+            </a:r>
+            <a:r>
+              <a:rPr lang="es-CL" sz="3600" dirty="0" err="1"/>
+              <a:t>serializable</a:t>
+            </a:r>
+            <a:r>
+              <a:rPr lang="es-CL" sz="3600" dirty="0"/>
+              <a:t> por conflicto?</a:t>
+            </a:r>
+          </a:p>
+        </p:txBody>
+      </p:sp>
+    </p:spTree>
+    <p:extLst>
+      <p:ext uri="{BB962C8B-B14F-4D97-AF65-F5344CB8AC3E}">
+        <p14:creationId xmlns:p14="http://schemas.microsoft.com/office/powerpoint/2010/main" val="3069932161"/>
+      </p:ext>
+    </p:extLst>
+  </p:cSld>
+  <p:clrMapOvr>
+    <a:masterClrMapping/>
+  </p:clrMapOvr>
+</p:sld>
+</file>
+
+<file path=ppt/slides/slide31.xml><?xml version="1.0" encoding="utf-8"?>
+<p:sld xmlns:a="http://schemas.openxmlformats.org/drawingml/2006/main" xmlns:r="http://schemas.openxmlformats.org/officeDocument/2006/relationships" xmlns:p="http://schemas.openxmlformats.org/presentationml/2006/main">
+  <p:cSld>
+    <p:spTree>
+      <p:nvGrpSpPr>
+        <p:cNvPr id="1" name=""/>
+        <p:cNvGrpSpPr/>
+        <p:nvPr/>
+      </p:nvGrpSpPr>
+      <p:grpSpPr>
+        <a:xfrm>
+          <a:off x="0" y="0"/>
+          <a:ext cx="0" cy="0"/>
+          <a:chOff x="0" y="0"/>
+          <a:chExt cx="0" cy="0"/>
+        </a:xfrm>
+      </p:grpSpPr>
+      <p:sp>
+        <p:nvSpPr>
+          <p:cNvPr id="2" name="Título 1">
+            <a:extLst>
+              <a:ext uri="{FF2B5EF4-FFF2-40B4-BE49-F238E27FC236}">
+                <a16:creationId xmlns:a16="http://schemas.microsoft.com/office/drawing/2014/main" id="{191C8431-6870-4CC6-8136-71B453CE80B1}"/>
+              </a:ext>
+            </a:extLst>
+          </p:cNvPr>
+          <p:cNvSpPr>
+            <a:spLocks noGrp="1"/>
+          </p:cNvSpPr>
+          <p:nvPr>
+            <p:ph type="title"/>
+          </p:nvPr>
+        </p:nvSpPr>
+        <p:spPr/>
+        <p:txBody>
+          <a:bodyPr>
+            <a:normAutofit/>
+          </a:bodyPr>
+          <a:lstStyle/>
+          <a:p>
+            <a:r>
               <a:rPr lang="es-CL" sz="4000" dirty="0"/>
               <a:t>Grafo de Precedencia</a:t>
             </a:r>
           </a:p>
         </p:txBody>
       </p:sp>
-      <mc:AlternateContent xmlns:mc="http://schemas.openxmlformats.org/markup-compatibility/2006">
-        <mc:Choice xmlns:a14="http://schemas.microsoft.com/office/drawing/2010/main" Requires="a14">
+      <mc:AlternateContent xmlns:mc="http://schemas.openxmlformats.org/markup-compatibility/2006" xmlns:a14="http://schemas.microsoft.com/office/drawing/2010/main">
+        <mc:Choice Requires="a14">
           <p:sp>
             <p:nvSpPr>
               <p:cNvPr id="3" name="Marcador de contenido 2">
@@ -9826,7 +10004,7 @@
             </p:txBody>
           </p:sp>
         </mc:Choice>
-        <mc:Fallback>
+        <mc:Fallback xmlns="">
           <p:sp>
             <p:nvSpPr>
               <p:cNvPr id="3" name="Marcador de contenido 2">
@@ -9879,7 +10057,7 @@
 </p:sld>
 </file>
 
-<file path=ppt/slides/slide31.xml><?xml version="1.0" encoding="utf-8"?>
+<file path=ppt/slides/slide32.xml><?xml version="1.0" encoding="utf-8"?>
 <p:sld xmlns:a="http://schemas.openxmlformats.org/drawingml/2006/main" xmlns:r="http://schemas.openxmlformats.org/officeDocument/2006/relationships" xmlns:p="http://schemas.openxmlformats.org/presentationml/2006/main">
   <p:cSld>
     <p:spTree>
@@ -9926,8 +10104,8 @@
           </a:p>
         </p:txBody>
       </p:sp>
-      <mc:AlternateContent xmlns:mc="http://schemas.openxmlformats.org/markup-compatibility/2006">
-        <mc:Choice xmlns:a14="http://schemas.microsoft.com/office/drawing/2010/main" Requires="a14">
+      <mc:AlternateContent xmlns:mc="http://schemas.openxmlformats.org/markup-compatibility/2006" xmlns:a14="http://schemas.microsoft.com/office/drawing/2010/main">
+        <mc:Choice Requires="a14">
           <p:sp>
             <p:nvSpPr>
               <p:cNvPr id="3" name="Marcador de contenido 2">
@@ -10357,11 +10535,9 @@
                 <a:endParaRPr lang="es-CL" sz="3200" dirty="0"/>
               </a:p>
               <a:p>
-                <a:pPr/>
                 <a:endParaRPr lang="es-CL" sz="3200" dirty="0"/>
               </a:p>
               <a:p>
-                <a:pPr/>
                 <a:r>
                   <a:rPr lang="es-CL" sz="3200" dirty="0"/>
                   <a:t>Nodos: </a:t>
@@ -10392,7 +10568,6 @@
                 <a:endParaRPr lang="es-CL" sz="3200" b="0" dirty="0"/>
               </a:p>
               <a:p>
-                <a:pPr/>
                 <a:r>
                   <a:rPr lang="es-CL" sz="3200" dirty="0"/>
                   <a:t>Arcos: </a:t>
@@ -10451,13 +10626,7 @@
                       <a:rPr lang="es-CL" sz="3200" b="0" i="1" smtClean="0">
                         <a:latin typeface="Cambria Math" panose="02040503050406030204" pitchFamily="18" charset="0"/>
                       </a:rPr>
-                      <m:t>1</m:t>
-                    </m:r>
-                    <m:r>
-                      <a:rPr lang="es-CL" sz="3200" b="0" i="1" smtClean="0">
-                        <a:latin typeface="Cambria Math" panose="02040503050406030204" pitchFamily="18" charset="0"/>
-                      </a:rPr>
-                      <m:t>}</m:t>
+                      <m:t>1}</m:t>
                     </m:r>
                   </m:oMath>
                 </a14:m>
@@ -10472,7 +10641,7 @@
             </p:txBody>
           </p:sp>
         </mc:Choice>
-        <mc:Fallback>
+        <mc:Fallback xmlns="">
           <p:sp>
             <p:nvSpPr>
               <p:cNvPr id="3" name="Marcador de contenido 2">
@@ -10656,7 +10825,7 @@
 </p:sld>
 </file>
 
-<file path=ppt/slides/slide32.xml><?xml version="1.0" encoding="utf-8"?>
+<file path=ppt/slides/slide33.xml><?xml version="1.0" encoding="utf-8"?>
 <p:sld xmlns:a="http://schemas.openxmlformats.org/drawingml/2006/main" xmlns:r="http://schemas.openxmlformats.org/officeDocument/2006/relationships" xmlns:p="http://schemas.openxmlformats.org/presentationml/2006/main">
   <p:cSld>
     <p:spTree>
@@ -10703,8 +10872,8 @@
           </a:p>
         </p:txBody>
       </p:sp>
-      <mc:AlternateContent xmlns:mc="http://schemas.openxmlformats.org/markup-compatibility/2006">
-        <mc:Choice xmlns:a14="http://schemas.microsoft.com/office/drawing/2010/main" Requires="a14">
+      <mc:AlternateContent xmlns:mc="http://schemas.openxmlformats.org/markup-compatibility/2006" xmlns:a14="http://schemas.microsoft.com/office/drawing/2010/main">
+        <mc:Choice Requires="a14">
           <p:sp>
             <p:nvSpPr>
               <p:cNvPr id="3" name="Marcador de contenido 2">
@@ -11141,7 +11310,7 @@
             </p:txBody>
           </p:sp>
         </mc:Choice>
-        <mc:Fallback>
+        <mc:Fallback xmlns="">
           <p:sp>
             <p:nvSpPr>
               <p:cNvPr id="3" name="Marcador de contenido 2">
@@ -11601,117 +11770,6 @@
 </p:sld>
 </file>
 
-<file path=ppt/slides/slide33.xml><?xml version="1.0" encoding="utf-8"?>
-<p:sld xmlns:a="http://schemas.openxmlformats.org/drawingml/2006/main" xmlns:r="http://schemas.openxmlformats.org/officeDocument/2006/relationships" xmlns:p="http://schemas.openxmlformats.org/presentationml/2006/main">
-  <p:cSld>
-    <p:spTree>
-      <p:nvGrpSpPr>
-        <p:cNvPr id="1" name=""/>
-        <p:cNvGrpSpPr/>
-        <p:nvPr/>
-      </p:nvGrpSpPr>
-      <p:grpSpPr>
-        <a:xfrm>
-          <a:off x="0" y="0"/>
-          <a:ext cx="0" cy="0"/>
-          <a:chOff x="0" y="0"/>
-          <a:chExt cx="0" cy="0"/>
-        </a:xfrm>
-      </p:grpSpPr>
-      <p:sp>
-        <p:nvSpPr>
-          <p:cNvPr id="2" name="Título 1">
-            <a:extLst>
-              <a:ext uri="{FF2B5EF4-FFF2-40B4-BE49-F238E27FC236}">
-                <a16:creationId xmlns:a16="http://schemas.microsoft.com/office/drawing/2014/main" id="{191C8431-6870-4CC6-8136-71B453CE80B1}"/>
-              </a:ext>
-            </a:extLst>
-          </p:cNvPr>
-          <p:cNvSpPr>
-            <a:spLocks noGrp="1"/>
-          </p:cNvSpPr>
-          <p:nvPr>
-            <p:ph type="title"/>
-          </p:nvPr>
-        </p:nvSpPr>
-        <p:spPr/>
-        <p:txBody>
-          <a:bodyPr>
-            <a:normAutofit/>
-          </a:bodyPr>
-          <a:lstStyle/>
-          <a:p>
-            <a:r>
-              <a:rPr lang="es-CL" sz="4000" dirty="0"/>
-              <a:t>Grafo de Precedencia - </a:t>
-            </a:r>
-            <a:r>
-              <a:rPr lang="es-CL" sz="4000" dirty="0" err="1"/>
-              <a:t>Serializabilidad</a:t>
-            </a:r>
-            <a:endParaRPr lang="es-CL" sz="4000" dirty="0"/>
-          </a:p>
-        </p:txBody>
-      </p:sp>
-      <p:sp>
-        <p:nvSpPr>
-          <p:cNvPr id="3" name="Marcador de contenido 2">
-            <a:extLst>
-              <a:ext uri="{FF2B5EF4-FFF2-40B4-BE49-F238E27FC236}">
-                <a16:creationId xmlns:a16="http://schemas.microsoft.com/office/drawing/2014/main" id="{2C41A32E-FCB9-4FF3-935B-4E570DC042B3}"/>
-              </a:ext>
-            </a:extLst>
-          </p:cNvPr>
-          <p:cNvSpPr>
-            <a:spLocks noGrp="1"/>
-          </p:cNvSpPr>
-          <p:nvPr>
-            <p:ph idx="1"/>
-          </p:nvPr>
-        </p:nvSpPr>
-        <p:spPr>
-          <a:xfrm>
-            <a:off x="581192" y="2180496"/>
-            <a:ext cx="11029615" cy="3333613"/>
-          </a:xfrm>
-        </p:spPr>
-        <p:txBody>
-          <a:bodyPr>
-            <a:normAutofit/>
-          </a:bodyPr>
-          <a:lstStyle/>
-          <a:p>
-            <a:pPr marL="0" indent="0" algn="ctr">
-              <a:buNone/>
-            </a:pPr>
-            <a:r>
-              <a:rPr lang="es-CL" sz="3200" dirty="0"/>
-              <a:t>Un plan es </a:t>
-            </a:r>
-            <a:r>
-              <a:rPr lang="es-CL" sz="3200" dirty="0" err="1"/>
-              <a:t>serializable</a:t>
-            </a:r>
-            <a:r>
-              <a:rPr lang="es-CL" sz="3200" dirty="0"/>
-              <a:t> por conflicto si y solo si su grafo de precedencia no tiene ciclos</a:t>
-            </a:r>
-          </a:p>
-        </p:txBody>
-      </p:sp>
-    </p:spTree>
-    <p:extLst>
-      <p:ext uri="{BB962C8B-B14F-4D97-AF65-F5344CB8AC3E}">
-        <p14:creationId xmlns:p14="http://schemas.microsoft.com/office/powerpoint/2010/main" val="1038182583"/>
-      </p:ext>
-    </p:extLst>
-  </p:cSld>
-  <p:clrMapOvr>
-    <a:masterClrMapping/>
-  </p:clrMapOvr>
-</p:sld>
-</file>
-
 <file path=ppt/slides/slide34.xml><?xml version="1.0" encoding="utf-8"?>
 <p:sld xmlns:a="http://schemas.openxmlformats.org/drawingml/2006/main" xmlns:r="http://schemas.openxmlformats.org/officeDocument/2006/relationships" xmlns:p="http://schemas.openxmlformats.org/presentationml/2006/main">
   <p:cSld>
@@ -11754,13 +11812,124 @@
           <a:p>
             <a:r>
               <a:rPr lang="es-CL" sz="4000" dirty="0"/>
-              <a:t>Grafo de Precedencia</a:t>
-            </a:r>
+              <a:t>Grafo de Precedencia - </a:t>
+            </a:r>
+            <a:r>
+              <a:rPr lang="es-CL" sz="4000" dirty="0" err="1"/>
+              <a:t>Serializabilidad</a:t>
+            </a:r>
+            <a:endParaRPr lang="es-CL" sz="4000" dirty="0"/>
           </a:p>
         </p:txBody>
       </p:sp>
-      <mc:AlternateContent xmlns:mc="http://schemas.openxmlformats.org/markup-compatibility/2006">
-        <mc:Choice xmlns:a14="http://schemas.microsoft.com/office/drawing/2010/main" Requires="a14">
+      <p:sp>
+        <p:nvSpPr>
+          <p:cNvPr id="3" name="Marcador de contenido 2">
+            <a:extLst>
+              <a:ext uri="{FF2B5EF4-FFF2-40B4-BE49-F238E27FC236}">
+                <a16:creationId xmlns:a16="http://schemas.microsoft.com/office/drawing/2014/main" id="{2C41A32E-FCB9-4FF3-935B-4E570DC042B3}"/>
+              </a:ext>
+            </a:extLst>
+          </p:cNvPr>
+          <p:cNvSpPr>
+            <a:spLocks noGrp="1"/>
+          </p:cNvSpPr>
+          <p:nvPr>
+            <p:ph idx="1"/>
+          </p:nvPr>
+        </p:nvSpPr>
+        <p:spPr>
+          <a:xfrm>
+            <a:off x="581192" y="2180496"/>
+            <a:ext cx="11029615" cy="3333613"/>
+          </a:xfrm>
+        </p:spPr>
+        <p:txBody>
+          <a:bodyPr>
+            <a:normAutofit/>
+          </a:bodyPr>
+          <a:lstStyle/>
+          <a:p>
+            <a:pPr marL="0" indent="0" algn="ctr">
+              <a:buNone/>
+            </a:pPr>
+            <a:r>
+              <a:rPr lang="es-CL" sz="3200" dirty="0"/>
+              <a:t>Un plan es </a:t>
+            </a:r>
+            <a:r>
+              <a:rPr lang="es-CL" sz="3200" dirty="0" err="1"/>
+              <a:t>serializable</a:t>
+            </a:r>
+            <a:r>
+              <a:rPr lang="es-CL" sz="3200" dirty="0"/>
+              <a:t> por conflicto si y solo si su grafo de precedencia no tiene ciclos</a:t>
+            </a:r>
+          </a:p>
+        </p:txBody>
+      </p:sp>
+    </p:spTree>
+    <p:extLst>
+      <p:ext uri="{BB962C8B-B14F-4D97-AF65-F5344CB8AC3E}">
+        <p14:creationId xmlns:p14="http://schemas.microsoft.com/office/powerpoint/2010/main" val="1038182583"/>
+      </p:ext>
+    </p:extLst>
+  </p:cSld>
+  <p:clrMapOvr>
+    <a:masterClrMapping/>
+  </p:clrMapOvr>
+</p:sld>
+</file>
+
+<file path=ppt/slides/slide35.xml><?xml version="1.0" encoding="utf-8"?>
+<p:sld xmlns:a="http://schemas.openxmlformats.org/drawingml/2006/main" xmlns:r="http://schemas.openxmlformats.org/officeDocument/2006/relationships" xmlns:p="http://schemas.openxmlformats.org/presentationml/2006/main">
+  <p:cSld>
+    <p:spTree>
+      <p:nvGrpSpPr>
+        <p:cNvPr id="1" name=""/>
+        <p:cNvGrpSpPr/>
+        <p:nvPr/>
+      </p:nvGrpSpPr>
+      <p:grpSpPr>
+        <a:xfrm>
+          <a:off x="0" y="0"/>
+          <a:ext cx="0" cy="0"/>
+          <a:chOff x="0" y="0"/>
+          <a:chExt cx="0" cy="0"/>
+        </a:xfrm>
+      </p:grpSpPr>
+      <p:sp>
+        <p:nvSpPr>
+          <p:cNvPr id="2" name="Título 1">
+            <a:extLst>
+              <a:ext uri="{FF2B5EF4-FFF2-40B4-BE49-F238E27FC236}">
+                <a16:creationId xmlns:a16="http://schemas.microsoft.com/office/drawing/2014/main" id="{191C8431-6870-4CC6-8136-71B453CE80B1}"/>
+              </a:ext>
+            </a:extLst>
+          </p:cNvPr>
+          <p:cNvSpPr>
+            <a:spLocks noGrp="1"/>
+          </p:cNvSpPr>
+          <p:nvPr>
+            <p:ph type="title"/>
+          </p:nvPr>
+        </p:nvSpPr>
+        <p:spPr/>
+        <p:txBody>
+          <a:bodyPr>
+            <a:normAutofit/>
+          </a:bodyPr>
+          <a:lstStyle/>
+          <a:p>
+            <a:r>
+              <a:rPr lang="es-CL" sz="4000" dirty="0"/>
+              <a:t>Grafo de Precedencia</a:t>
+            </a:r>
+          </a:p>
+        </p:txBody>
+      </p:sp>
+      <mc:AlternateContent xmlns:mc="http://schemas.openxmlformats.org/markup-compatibility/2006" xmlns:a14="http://schemas.microsoft.com/office/drawing/2010/main">
+        <mc:Choice Requires="a14">
           <p:sp>
             <p:nvSpPr>
               <p:cNvPr id="3" name="Marcador de contenido 2">
@@ -12197,7 +12366,7 @@
             </p:txBody>
           </p:sp>
         </mc:Choice>
-        <mc:Fallback>
+        <mc:Fallback xmlns="">
           <p:sp>
             <p:nvSpPr>
               <p:cNvPr id="3" name="Marcador de contenido 2">
@@ -12657,7 +12826,7 @@
 </p:sld>
 </file>
 
-<file path=ppt/slides/slide35.xml><?xml version="1.0" encoding="utf-8"?>
+<file path=ppt/slides/slide36.xml><?xml version="1.0" encoding="utf-8"?>
 <p:sld xmlns:a="http://schemas.openxmlformats.org/drawingml/2006/main" xmlns:r="http://schemas.openxmlformats.org/officeDocument/2006/relationships" xmlns:p="http://schemas.openxmlformats.org/presentationml/2006/main">
   <p:cSld>
     <p:spTree>
@@ -12704,8 +12873,8 @@
           </a:p>
         </p:txBody>
       </p:sp>
-      <mc:AlternateContent xmlns:mc="http://schemas.openxmlformats.org/markup-compatibility/2006">
-        <mc:Choice xmlns:a14="http://schemas.microsoft.com/office/drawing/2010/main" Requires="a14">
+      <mc:AlternateContent xmlns:mc="http://schemas.openxmlformats.org/markup-compatibility/2006" xmlns:a14="http://schemas.microsoft.com/office/drawing/2010/main">
+        <mc:Choice Requires="a14">
           <p:sp>
             <p:nvSpPr>
               <p:cNvPr id="3" name="Marcador de contenido 2">
@@ -13142,7 +13311,7 @@
             </p:txBody>
           </p:sp>
         </mc:Choice>
-        <mc:Fallback>
+        <mc:Fallback xmlns="">
           <p:sp>
             <p:nvSpPr>
               <p:cNvPr id="3" name="Marcador de contenido 2">
@@ -13611,99 +13780,6 @@
 </p:sld>
 </file>
 
-<file path=ppt/slides/slide36.xml><?xml version="1.0" encoding="utf-8"?>
-<p:sld xmlns:a="http://schemas.openxmlformats.org/drawingml/2006/main" xmlns:r="http://schemas.openxmlformats.org/officeDocument/2006/relationships" xmlns:p="http://schemas.openxmlformats.org/presentationml/2006/main">
-  <p:cSld>
-    <p:spTree>
-      <p:nvGrpSpPr>
-        <p:cNvPr id="1" name=""/>
-        <p:cNvGrpSpPr/>
-        <p:nvPr/>
-      </p:nvGrpSpPr>
-      <p:grpSpPr>
-        <a:xfrm>
-          <a:off x="0" y="0"/>
-          <a:ext cx="0" cy="0"/>
-          <a:chOff x="0" y="0"/>
-          <a:chExt cx="0" cy="0"/>
-        </a:xfrm>
-      </p:grpSpPr>
-      <p:sp>
-        <p:nvSpPr>
-          <p:cNvPr id="2" name="Título 1">
-            <a:extLst>
-              <a:ext uri="{FF2B5EF4-FFF2-40B4-BE49-F238E27FC236}">
-                <a16:creationId xmlns:a16="http://schemas.microsoft.com/office/drawing/2014/main" id="{191C8431-6870-4CC6-8136-71B453CE80B1}"/>
-              </a:ext>
-            </a:extLst>
-          </p:cNvPr>
-          <p:cNvSpPr>
-            <a:spLocks noGrp="1"/>
-          </p:cNvSpPr>
-          <p:nvPr>
-            <p:ph type="title"/>
-          </p:nvPr>
-        </p:nvSpPr>
-        <p:spPr/>
-        <p:txBody>
-          <a:bodyPr>
-            <a:normAutofit/>
-          </a:bodyPr>
-          <a:lstStyle/>
-          <a:p>
-            <a:r>
-              <a:rPr lang="es-CL" sz="4000" dirty="0"/>
-              <a:t>Recuperabilidad</a:t>
-            </a:r>
-          </a:p>
-        </p:txBody>
-      </p:sp>
-      <p:sp>
-        <p:nvSpPr>
-          <p:cNvPr id="3" name="Marcador de contenido 2">
-            <a:extLst>
-              <a:ext uri="{FF2B5EF4-FFF2-40B4-BE49-F238E27FC236}">
-                <a16:creationId xmlns:a16="http://schemas.microsoft.com/office/drawing/2014/main" id="{2C41A32E-FCB9-4FF3-935B-4E570DC042B3}"/>
-              </a:ext>
-            </a:extLst>
-          </p:cNvPr>
-          <p:cNvSpPr>
-            <a:spLocks noGrp="1"/>
-          </p:cNvSpPr>
-          <p:nvPr>
-            <p:ph idx="1"/>
-          </p:nvPr>
-        </p:nvSpPr>
-        <p:spPr/>
-        <p:txBody>
-          <a:bodyPr>
-            <a:normAutofit/>
-          </a:bodyPr>
-          <a:lstStyle/>
-          <a:p>
-            <a:pPr marL="0" indent="0" algn="ctr">
-              <a:buNone/>
-            </a:pPr>
-            <a:r>
-              <a:rPr lang="es-CL" sz="3600" dirty="0"/>
-              <a:t>Si una transacción aborta es necesario dejar la base de datos consistente. Las planificaciones que intentan hacer esto se llaman recuperables</a:t>
-            </a:r>
-          </a:p>
-        </p:txBody>
-      </p:sp>
-    </p:spTree>
-    <p:extLst>
-      <p:ext uri="{BB962C8B-B14F-4D97-AF65-F5344CB8AC3E}">
-        <p14:creationId xmlns:p14="http://schemas.microsoft.com/office/powerpoint/2010/main" val="660474354"/>
-      </p:ext>
-    </p:extLst>
-  </p:cSld>
-  <p:clrMapOvr>
-    <a:masterClrMapping/>
-  </p:clrMapOvr>
-</p:sld>
-</file>
-
 <file path=ppt/slides/slide37.xml><?xml version="1.0" encoding="utf-8"?>
 <p:sld xmlns:a="http://schemas.openxmlformats.org/drawingml/2006/main" xmlns:r="http://schemas.openxmlformats.org/officeDocument/2006/relationships" xmlns:p="http://schemas.openxmlformats.org/presentationml/2006/main">
   <p:cSld>
@@ -13746,7 +13822,7 @@
           <a:p>
             <a:r>
               <a:rPr lang="es-CL" sz="4000" dirty="0"/>
-              <a:t>Plan recuperable</a:t>
+              <a:t>Recuperabilidad</a:t>
             </a:r>
           </a:p>
         </p:txBody>
@@ -13779,6 +13855,99 @@
             </a:pPr>
             <a:r>
               <a:rPr lang="es-CL" sz="3600" dirty="0"/>
+              <a:t>Si una transacción aborta es necesario dejar la base de datos consistente. Las planificaciones que intentan hacer esto se llaman recuperables</a:t>
+            </a:r>
+          </a:p>
+        </p:txBody>
+      </p:sp>
+    </p:spTree>
+    <p:extLst>
+      <p:ext uri="{BB962C8B-B14F-4D97-AF65-F5344CB8AC3E}">
+        <p14:creationId xmlns:p14="http://schemas.microsoft.com/office/powerpoint/2010/main" val="660474354"/>
+      </p:ext>
+    </p:extLst>
+  </p:cSld>
+  <p:clrMapOvr>
+    <a:masterClrMapping/>
+  </p:clrMapOvr>
+</p:sld>
+</file>
+
+<file path=ppt/slides/slide38.xml><?xml version="1.0" encoding="utf-8"?>
+<p:sld xmlns:a="http://schemas.openxmlformats.org/drawingml/2006/main" xmlns:r="http://schemas.openxmlformats.org/officeDocument/2006/relationships" xmlns:p="http://schemas.openxmlformats.org/presentationml/2006/main">
+  <p:cSld>
+    <p:spTree>
+      <p:nvGrpSpPr>
+        <p:cNvPr id="1" name=""/>
+        <p:cNvGrpSpPr/>
+        <p:nvPr/>
+      </p:nvGrpSpPr>
+      <p:grpSpPr>
+        <a:xfrm>
+          <a:off x="0" y="0"/>
+          <a:ext cx="0" cy="0"/>
+          <a:chOff x="0" y="0"/>
+          <a:chExt cx="0" cy="0"/>
+        </a:xfrm>
+      </p:grpSpPr>
+      <p:sp>
+        <p:nvSpPr>
+          <p:cNvPr id="2" name="Título 1">
+            <a:extLst>
+              <a:ext uri="{FF2B5EF4-FFF2-40B4-BE49-F238E27FC236}">
+                <a16:creationId xmlns:a16="http://schemas.microsoft.com/office/drawing/2014/main" id="{191C8431-6870-4CC6-8136-71B453CE80B1}"/>
+              </a:ext>
+            </a:extLst>
+          </p:cNvPr>
+          <p:cNvSpPr>
+            <a:spLocks noGrp="1"/>
+          </p:cNvSpPr>
+          <p:nvPr>
+            <p:ph type="title"/>
+          </p:nvPr>
+        </p:nvSpPr>
+        <p:spPr/>
+        <p:txBody>
+          <a:bodyPr>
+            <a:normAutofit/>
+          </a:bodyPr>
+          <a:lstStyle/>
+          <a:p>
+            <a:r>
+              <a:rPr lang="es-CL" sz="4000" dirty="0"/>
+              <a:t>Plan recuperable</a:t>
+            </a:r>
+          </a:p>
+        </p:txBody>
+      </p:sp>
+      <p:sp>
+        <p:nvSpPr>
+          <p:cNvPr id="3" name="Marcador de contenido 2">
+            <a:extLst>
+              <a:ext uri="{FF2B5EF4-FFF2-40B4-BE49-F238E27FC236}">
+                <a16:creationId xmlns:a16="http://schemas.microsoft.com/office/drawing/2014/main" id="{2C41A32E-FCB9-4FF3-935B-4E570DC042B3}"/>
+              </a:ext>
+            </a:extLst>
+          </p:cNvPr>
+          <p:cNvSpPr>
+            <a:spLocks noGrp="1"/>
+          </p:cNvSpPr>
+          <p:nvPr>
+            <p:ph idx="1"/>
+          </p:nvPr>
+        </p:nvSpPr>
+        <p:spPr/>
+        <p:txBody>
+          <a:bodyPr>
+            <a:normAutofit/>
+          </a:bodyPr>
+          <a:lstStyle/>
+          <a:p>
+            <a:pPr marL="0" indent="0" algn="ctr">
+              <a:buNone/>
+            </a:pPr>
+            <a:r>
+              <a:rPr lang="es-CL" sz="3600" dirty="0"/>
               <a:t>Un plan es recuperable si ninguna transacción se confirma antes de que se hayan confirmado todas las transacciones de las que leyó</a:t>
             </a:r>
           </a:p>
@@ -13797,7 +13966,7 @@
 </p:sld>
 </file>
 
-<file path=ppt/slides/slide38.xml><?xml version="1.0" encoding="utf-8"?>
+<file path=ppt/slides/slide39.xml><?xml version="1.0" encoding="utf-8"?>
 <p:sld xmlns:a="http://schemas.openxmlformats.org/drawingml/2006/main" xmlns:r="http://schemas.openxmlformats.org/officeDocument/2006/relationships" xmlns:p="http://schemas.openxmlformats.org/presentationml/2006/main">
   <p:cSld>
     <p:spTree>
@@ -14311,7 +14480,340 @@
 </p:sld>
 </file>
 
-<file path=ppt/slides/slide39.xml><?xml version="1.0" encoding="utf-8"?>
+<file path=ppt/slides/slide4.xml><?xml version="1.0" encoding="utf-8"?>
+<p:sld xmlns:a="http://schemas.openxmlformats.org/drawingml/2006/main" xmlns:r="http://schemas.openxmlformats.org/officeDocument/2006/relationships" xmlns:p="http://schemas.openxmlformats.org/presentationml/2006/main">
+  <p:cSld>
+    <p:spTree>
+      <p:nvGrpSpPr>
+        <p:cNvPr id="1" name=""/>
+        <p:cNvGrpSpPr/>
+        <p:nvPr/>
+      </p:nvGrpSpPr>
+      <p:grpSpPr>
+        <a:xfrm>
+          <a:off x="0" y="0"/>
+          <a:ext cx="0" cy="0"/>
+          <a:chOff x="0" y="0"/>
+          <a:chExt cx="0" cy="0"/>
+        </a:xfrm>
+      </p:grpSpPr>
+      <p:sp>
+        <p:nvSpPr>
+          <p:cNvPr id="2" name="Título 1">
+            <a:extLst>
+              <a:ext uri="{FF2B5EF4-FFF2-40B4-BE49-F238E27FC236}">
+                <a16:creationId xmlns:a16="http://schemas.microsoft.com/office/drawing/2014/main" id="{EA614BF4-58CD-4546-B3D1-8A66A301A569}"/>
+              </a:ext>
+            </a:extLst>
+          </p:cNvPr>
+          <p:cNvSpPr>
+            <a:spLocks noGrp="1"/>
+          </p:cNvSpPr>
+          <p:nvPr>
+            <p:ph type="title"/>
+          </p:nvPr>
+        </p:nvSpPr>
+        <p:spPr/>
+        <p:txBody>
+          <a:bodyPr>
+            <a:normAutofit/>
+          </a:bodyPr>
+          <a:lstStyle/>
+          <a:p>
+            <a:r>
+              <a:rPr lang="es-CL" sz="4000" dirty="0"/>
+              <a:t>Transacciones - Operaciones</a:t>
+            </a:r>
+          </a:p>
+        </p:txBody>
+      </p:sp>
+      <mc:AlternateContent xmlns:mc="http://schemas.openxmlformats.org/markup-compatibility/2006" xmlns:a14="http://schemas.microsoft.com/office/drawing/2010/main">
+        <mc:Choice Requires="a14">
+          <p:sp>
+            <p:nvSpPr>
+              <p:cNvPr id="3" name="Marcador de contenido 2">
+                <a:extLst>
+                  <a:ext uri="{FF2B5EF4-FFF2-40B4-BE49-F238E27FC236}">
+                    <a16:creationId xmlns:a16="http://schemas.microsoft.com/office/drawing/2014/main" id="{674A9B87-619A-458A-9F1F-A22950D23A51}"/>
+                  </a:ext>
+                </a:extLst>
+              </p:cNvPr>
+              <p:cNvSpPr>
+                <a:spLocks noGrp="1"/>
+              </p:cNvSpPr>
+              <p:nvPr>
+                <p:ph idx="1"/>
+              </p:nvPr>
+            </p:nvSpPr>
+            <p:spPr/>
+            <p:txBody>
+              <a:bodyPr>
+                <a:normAutofit/>
+              </a:bodyPr>
+              <a:lstStyle/>
+              <a:p>
+                <a:r>
+                  <a:rPr lang="es-CL" sz="2200" b="1" dirty="0"/>
+                  <a:t>Lectura </a:t>
+                </a:r>
+                <a:r>
+                  <a:rPr lang="es-CL" sz="2200" dirty="0"/>
+                  <a:t>– </a:t>
+                </a:r>
+                <a14:m>
+                  <m:oMath xmlns:m="http://schemas.openxmlformats.org/officeDocument/2006/math">
+                    <m:sSub>
+                      <m:sSubPr>
+                        <m:ctrlPr>
+                          <a:rPr lang="es-CL" sz="2200" b="0" i="1" smtClean="0">
+                            <a:latin typeface="Cambria Math" panose="02040503050406030204" pitchFamily="18" charset="0"/>
+                          </a:rPr>
+                        </m:ctrlPr>
+                      </m:sSubPr>
+                      <m:e>
+                        <m:r>
+                          <a:rPr lang="es-CL" sz="2200" b="0" i="1" smtClean="0">
+                            <a:latin typeface="Cambria Math" panose="02040503050406030204" pitchFamily="18" charset="0"/>
+                          </a:rPr>
+                          <m:t>𝑅</m:t>
+                        </m:r>
+                      </m:e>
+                      <m:sub>
+                        <m:r>
+                          <a:rPr lang="es-CL" sz="2200" b="0" i="1" smtClean="0">
+                            <a:latin typeface="Cambria Math" panose="02040503050406030204" pitchFamily="18" charset="0"/>
+                          </a:rPr>
+                          <m:t>𝑖</m:t>
+                        </m:r>
+                      </m:sub>
+                    </m:sSub>
+                    <m:d>
+                      <m:dPr>
+                        <m:ctrlPr>
+                          <a:rPr lang="es-CL" sz="2200" b="0" i="1" smtClean="0">
+                            <a:latin typeface="Cambria Math" panose="02040503050406030204" pitchFamily="18" charset="0"/>
+                          </a:rPr>
+                        </m:ctrlPr>
+                      </m:dPr>
+                      <m:e>
+                        <m:r>
+                          <a:rPr lang="es-CL" sz="2200" b="0" i="1" smtClean="0">
+                            <a:latin typeface="Cambria Math" panose="02040503050406030204" pitchFamily="18" charset="0"/>
+                          </a:rPr>
+                          <m:t>𝑋</m:t>
+                        </m:r>
+                      </m:e>
+                    </m:d>
+                  </m:oMath>
+                </a14:m>
+                <a:r>
+                  <a:rPr lang="es-CL" sz="2200" dirty="0"/>
+                  <a:t> indica lectura de objeto X en la base de datos por la transacción i</a:t>
+                </a:r>
+              </a:p>
+              <a:p>
+                <a:r>
+                  <a:rPr lang="es-CL" sz="2200" b="1" dirty="0"/>
+                  <a:t>Escritura </a:t>
+                </a:r>
+                <a:r>
+                  <a:rPr lang="es-CL" sz="2200" dirty="0"/>
+                  <a:t>– </a:t>
+                </a:r>
+                <a14:m>
+                  <m:oMath xmlns:m="http://schemas.openxmlformats.org/officeDocument/2006/math">
+                    <m:sSub>
+                      <m:sSubPr>
+                        <m:ctrlPr>
+                          <a:rPr lang="es-CL" sz="2200" i="1">
+                            <a:latin typeface="Cambria Math" panose="02040503050406030204" pitchFamily="18" charset="0"/>
+                          </a:rPr>
+                        </m:ctrlPr>
+                      </m:sSubPr>
+                      <m:e>
+                        <m:r>
+                          <a:rPr lang="es-CL" sz="2200" b="0" i="1" smtClean="0">
+                            <a:latin typeface="Cambria Math" panose="02040503050406030204" pitchFamily="18" charset="0"/>
+                          </a:rPr>
+                          <m:t>𝑊</m:t>
+                        </m:r>
+                      </m:e>
+                      <m:sub>
+                        <m:r>
+                          <a:rPr lang="es-CL" sz="2200" i="1">
+                            <a:latin typeface="Cambria Math" panose="02040503050406030204" pitchFamily="18" charset="0"/>
+                          </a:rPr>
+                          <m:t>𝑖</m:t>
+                        </m:r>
+                      </m:sub>
+                    </m:sSub>
+                    <m:d>
+                      <m:dPr>
+                        <m:ctrlPr>
+                          <a:rPr lang="es-CL" sz="2200" i="1">
+                            <a:latin typeface="Cambria Math" panose="02040503050406030204" pitchFamily="18" charset="0"/>
+                          </a:rPr>
+                        </m:ctrlPr>
+                      </m:dPr>
+                      <m:e>
+                        <m:r>
+                          <a:rPr lang="es-CL" sz="2200" i="1">
+                            <a:latin typeface="Cambria Math" panose="02040503050406030204" pitchFamily="18" charset="0"/>
+                          </a:rPr>
+                          <m:t>𝑋</m:t>
+                        </m:r>
+                      </m:e>
+                    </m:d>
+                  </m:oMath>
+                </a14:m>
+                <a:r>
+                  <a:rPr lang="es-CL" sz="2200" dirty="0"/>
+                  <a:t> indica escritura de objeto X en la base de datos por la transacción i</a:t>
+                </a:r>
+              </a:p>
+              <a:p>
+                <a:r>
+                  <a:rPr lang="es-CL" sz="2200" b="1" dirty="0"/>
+                  <a:t>Compromiso </a:t>
+                </a:r>
+                <a:r>
+                  <a:rPr lang="es-CL" sz="2200" dirty="0"/>
+                  <a:t>- </a:t>
+                </a:r>
+                <a14:m>
+                  <m:oMath xmlns:m="http://schemas.openxmlformats.org/officeDocument/2006/math">
+                    <m:sSub>
+                      <m:sSubPr>
+                        <m:ctrlPr>
+                          <a:rPr lang="es-CL" sz="2200" b="0" i="1" smtClean="0">
+                            <a:latin typeface="Cambria Math" panose="02040503050406030204" pitchFamily="18" charset="0"/>
+                          </a:rPr>
+                        </m:ctrlPr>
+                      </m:sSubPr>
+                      <m:e>
+                        <m:r>
+                          <a:rPr lang="es-CL" sz="2200" b="0" i="1" smtClean="0">
+                            <a:latin typeface="Cambria Math" panose="02040503050406030204" pitchFamily="18" charset="0"/>
+                          </a:rPr>
+                          <m:t>𝐶</m:t>
+                        </m:r>
+                      </m:e>
+                      <m:sub>
+                        <m:r>
+                          <a:rPr lang="es-CL" sz="2200" b="0" i="1" smtClean="0">
+                            <a:latin typeface="Cambria Math" panose="02040503050406030204" pitchFamily="18" charset="0"/>
+                          </a:rPr>
+                          <m:t>𝑖</m:t>
+                        </m:r>
+                      </m:sub>
+                    </m:sSub>
+                  </m:oMath>
+                </a14:m>
+                <a:r>
+                  <a:rPr lang="es-CL" sz="2200" dirty="0"/>
+                  <a:t> indica el compromiso de la transacción i</a:t>
+                </a:r>
+              </a:p>
+              <a:p>
+                <a:r>
+                  <a:rPr lang="es-CL" sz="2200" b="1" dirty="0"/>
+                  <a:t>Aborto</a:t>
+                </a:r>
+                <a:r>
+                  <a:rPr lang="es-CL" sz="2200" dirty="0"/>
+                  <a:t> - </a:t>
+                </a:r>
+                <a14:m>
+                  <m:oMath xmlns:m="http://schemas.openxmlformats.org/officeDocument/2006/math">
+                    <m:sSub>
+                      <m:sSubPr>
+                        <m:ctrlPr>
+                          <a:rPr lang="es-CL" sz="2200" i="1">
+                            <a:latin typeface="Cambria Math" panose="02040503050406030204" pitchFamily="18" charset="0"/>
+                          </a:rPr>
+                        </m:ctrlPr>
+                      </m:sSubPr>
+                      <m:e>
+                        <m:r>
+                          <a:rPr lang="es-CL" sz="2200" b="0" i="1" smtClean="0">
+                            <a:latin typeface="Cambria Math" panose="02040503050406030204" pitchFamily="18" charset="0"/>
+                          </a:rPr>
+                          <m:t>𝐴</m:t>
+                        </m:r>
+                      </m:e>
+                      <m:sub>
+                        <m:r>
+                          <a:rPr lang="es-CL" sz="2200" i="1">
+                            <a:latin typeface="Cambria Math" panose="02040503050406030204" pitchFamily="18" charset="0"/>
+                          </a:rPr>
+                          <m:t>𝑖</m:t>
+                        </m:r>
+                      </m:sub>
+                    </m:sSub>
+                  </m:oMath>
+                </a14:m>
+                <a:r>
+                  <a:rPr lang="es-CL" sz="2200" dirty="0"/>
+                  <a:t> indica el aborto de la transacción i</a:t>
+                </a:r>
+              </a:p>
+            </p:txBody>
+          </p:sp>
+        </mc:Choice>
+        <mc:Fallback xmlns="">
+          <p:sp>
+            <p:nvSpPr>
+              <p:cNvPr id="3" name="Marcador de contenido 2">
+                <a:extLst>
+                  <a:ext uri="{FF2B5EF4-FFF2-40B4-BE49-F238E27FC236}">
+                    <a16:creationId xmlns:a16="http://schemas.microsoft.com/office/drawing/2014/main" id="{674A9B87-619A-458A-9F1F-A22950D23A51}"/>
+                  </a:ext>
+                </a:extLst>
+              </p:cNvPr>
+              <p:cNvSpPr>
+                <a:spLocks noGrp="1" noRot="1" noChangeAspect="1" noMove="1" noResize="1" noEditPoints="1" noAdjustHandles="1" noChangeArrowheads="1" noChangeShapeType="1" noTextEdit="1"/>
+              </p:cNvSpPr>
+              <p:nvPr>
+                <p:ph idx="1"/>
+              </p:nvPr>
+            </p:nvSpPr>
+            <p:spPr>
+              <a:blipFill>
+                <a:blip r:embed="rId2"/>
+                <a:stretch>
+                  <a:fillRect l="-387"/>
+                </a:stretch>
+              </a:blipFill>
+            </p:spPr>
+            <p:txBody>
+              <a:bodyPr/>
+              <a:lstStyle/>
+              <a:p>
+                <a:r>
+                  <a:rPr lang="es-CL">
+                    <a:noFill/>
+                  </a:rPr>
+                  <a:t> </a:t>
+                </a:r>
+              </a:p>
+            </p:txBody>
+          </p:sp>
+        </mc:Fallback>
+      </mc:AlternateContent>
+    </p:spTree>
+    <p:extLst>
+      <p:ext uri="{BB962C8B-B14F-4D97-AF65-F5344CB8AC3E}">
+        <p14:creationId xmlns:p14="http://schemas.microsoft.com/office/powerpoint/2010/main" val="2368034604"/>
+      </p:ext>
+    </p:extLst>
+  </p:cSld>
+  <p:clrMapOvr>
+    <a:masterClrMapping/>
+  </p:clrMapOvr>
+</p:sld>
+</file>
+
+<file path=ppt/slides/slide40.xml><?xml version="1.0" encoding="utf-8"?>
 <p:sld xmlns:a="http://schemas.openxmlformats.org/drawingml/2006/main" xmlns:r="http://schemas.openxmlformats.org/officeDocument/2006/relationships" xmlns:p="http://schemas.openxmlformats.org/presentationml/2006/main">
   <p:cSld>
     <p:spTree>
@@ -14825,340 +15327,7 @@
 </p:sld>
 </file>
 
-<file path=ppt/slides/slide4.xml><?xml version="1.0" encoding="utf-8"?>
-<p:sld xmlns:a="http://schemas.openxmlformats.org/drawingml/2006/main" xmlns:r="http://schemas.openxmlformats.org/officeDocument/2006/relationships" xmlns:p="http://schemas.openxmlformats.org/presentationml/2006/main">
-  <p:cSld>
-    <p:spTree>
-      <p:nvGrpSpPr>
-        <p:cNvPr id="1" name=""/>
-        <p:cNvGrpSpPr/>
-        <p:nvPr/>
-      </p:nvGrpSpPr>
-      <p:grpSpPr>
-        <a:xfrm>
-          <a:off x="0" y="0"/>
-          <a:ext cx="0" cy="0"/>
-          <a:chOff x="0" y="0"/>
-          <a:chExt cx="0" cy="0"/>
-        </a:xfrm>
-      </p:grpSpPr>
-      <p:sp>
-        <p:nvSpPr>
-          <p:cNvPr id="2" name="Título 1">
-            <a:extLst>
-              <a:ext uri="{FF2B5EF4-FFF2-40B4-BE49-F238E27FC236}">
-                <a16:creationId xmlns:a16="http://schemas.microsoft.com/office/drawing/2014/main" id="{EA614BF4-58CD-4546-B3D1-8A66A301A569}"/>
-              </a:ext>
-            </a:extLst>
-          </p:cNvPr>
-          <p:cNvSpPr>
-            <a:spLocks noGrp="1"/>
-          </p:cNvSpPr>
-          <p:nvPr>
-            <p:ph type="title"/>
-          </p:nvPr>
-        </p:nvSpPr>
-        <p:spPr/>
-        <p:txBody>
-          <a:bodyPr>
-            <a:normAutofit/>
-          </a:bodyPr>
-          <a:lstStyle/>
-          <a:p>
-            <a:r>
-              <a:rPr lang="es-CL" sz="4000" dirty="0"/>
-              <a:t>Transacciones - Operaciones</a:t>
-            </a:r>
-          </a:p>
-        </p:txBody>
-      </p:sp>
-      <mc:AlternateContent xmlns:mc="http://schemas.openxmlformats.org/markup-compatibility/2006">
-        <mc:Choice xmlns:a14="http://schemas.microsoft.com/office/drawing/2010/main" Requires="a14">
-          <p:sp>
-            <p:nvSpPr>
-              <p:cNvPr id="3" name="Marcador de contenido 2">
-                <a:extLst>
-                  <a:ext uri="{FF2B5EF4-FFF2-40B4-BE49-F238E27FC236}">
-                    <a16:creationId xmlns:a16="http://schemas.microsoft.com/office/drawing/2014/main" id="{674A9B87-619A-458A-9F1F-A22950D23A51}"/>
-                  </a:ext>
-                </a:extLst>
-              </p:cNvPr>
-              <p:cNvSpPr>
-                <a:spLocks noGrp="1"/>
-              </p:cNvSpPr>
-              <p:nvPr>
-                <p:ph idx="1"/>
-              </p:nvPr>
-            </p:nvSpPr>
-            <p:spPr/>
-            <p:txBody>
-              <a:bodyPr>
-                <a:normAutofit/>
-              </a:bodyPr>
-              <a:lstStyle/>
-              <a:p>
-                <a:r>
-                  <a:rPr lang="es-CL" sz="2200" b="1" dirty="0"/>
-                  <a:t>Lectura </a:t>
-                </a:r>
-                <a:r>
-                  <a:rPr lang="es-CL" sz="2200" dirty="0"/>
-                  <a:t>– </a:t>
-                </a:r>
-                <a14:m>
-                  <m:oMath xmlns:m="http://schemas.openxmlformats.org/officeDocument/2006/math">
-                    <m:sSub>
-                      <m:sSubPr>
-                        <m:ctrlPr>
-                          <a:rPr lang="es-CL" sz="2200" b="0" i="1" smtClean="0">
-                            <a:latin typeface="Cambria Math" panose="02040503050406030204" pitchFamily="18" charset="0"/>
-                          </a:rPr>
-                        </m:ctrlPr>
-                      </m:sSubPr>
-                      <m:e>
-                        <m:r>
-                          <a:rPr lang="es-CL" sz="2200" b="0" i="1" smtClean="0">
-                            <a:latin typeface="Cambria Math" panose="02040503050406030204" pitchFamily="18" charset="0"/>
-                          </a:rPr>
-                          <m:t>𝑅</m:t>
-                        </m:r>
-                      </m:e>
-                      <m:sub>
-                        <m:r>
-                          <a:rPr lang="es-CL" sz="2200" b="0" i="1" smtClean="0">
-                            <a:latin typeface="Cambria Math" panose="02040503050406030204" pitchFamily="18" charset="0"/>
-                          </a:rPr>
-                          <m:t>𝑖</m:t>
-                        </m:r>
-                      </m:sub>
-                    </m:sSub>
-                    <m:d>
-                      <m:dPr>
-                        <m:ctrlPr>
-                          <a:rPr lang="es-CL" sz="2200" b="0" i="1" smtClean="0">
-                            <a:latin typeface="Cambria Math" panose="02040503050406030204" pitchFamily="18" charset="0"/>
-                          </a:rPr>
-                        </m:ctrlPr>
-                      </m:dPr>
-                      <m:e>
-                        <m:r>
-                          <a:rPr lang="es-CL" sz="2200" b="0" i="1" smtClean="0">
-                            <a:latin typeface="Cambria Math" panose="02040503050406030204" pitchFamily="18" charset="0"/>
-                          </a:rPr>
-                          <m:t>𝑋</m:t>
-                        </m:r>
-                      </m:e>
-                    </m:d>
-                  </m:oMath>
-                </a14:m>
-                <a:r>
-                  <a:rPr lang="es-CL" sz="2200" dirty="0"/>
-                  <a:t> indica lectura de objeto X en la base de datos por la transacción i</a:t>
-                </a:r>
-              </a:p>
-              <a:p>
-                <a:r>
-                  <a:rPr lang="es-CL" sz="2200" b="1" dirty="0"/>
-                  <a:t>Escritura </a:t>
-                </a:r>
-                <a:r>
-                  <a:rPr lang="es-CL" sz="2200" dirty="0"/>
-                  <a:t>– </a:t>
-                </a:r>
-                <a14:m>
-                  <m:oMath xmlns:m="http://schemas.openxmlformats.org/officeDocument/2006/math">
-                    <m:sSub>
-                      <m:sSubPr>
-                        <m:ctrlPr>
-                          <a:rPr lang="es-CL" sz="2200" i="1">
-                            <a:latin typeface="Cambria Math" panose="02040503050406030204" pitchFamily="18" charset="0"/>
-                          </a:rPr>
-                        </m:ctrlPr>
-                      </m:sSubPr>
-                      <m:e>
-                        <m:r>
-                          <a:rPr lang="es-CL" sz="2200" b="0" i="1" smtClean="0">
-                            <a:latin typeface="Cambria Math" panose="02040503050406030204" pitchFamily="18" charset="0"/>
-                          </a:rPr>
-                          <m:t>𝑊</m:t>
-                        </m:r>
-                      </m:e>
-                      <m:sub>
-                        <m:r>
-                          <a:rPr lang="es-CL" sz="2200" i="1">
-                            <a:latin typeface="Cambria Math" panose="02040503050406030204" pitchFamily="18" charset="0"/>
-                          </a:rPr>
-                          <m:t>𝑖</m:t>
-                        </m:r>
-                      </m:sub>
-                    </m:sSub>
-                    <m:d>
-                      <m:dPr>
-                        <m:ctrlPr>
-                          <a:rPr lang="es-CL" sz="2200" i="1">
-                            <a:latin typeface="Cambria Math" panose="02040503050406030204" pitchFamily="18" charset="0"/>
-                          </a:rPr>
-                        </m:ctrlPr>
-                      </m:dPr>
-                      <m:e>
-                        <m:r>
-                          <a:rPr lang="es-CL" sz="2200" i="1">
-                            <a:latin typeface="Cambria Math" panose="02040503050406030204" pitchFamily="18" charset="0"/>
-                          </a:rPr>
-                          <m:t>𝑋</m:t>
-                        </m:r>
-                      </m:e>
-                    </m:d>
-                  </m:oMath>
-                </a14:m>
-                <a:r>
-                  <a:rPr lang="es-CL" sz="2200" dirty="0"/>
-                  <a:t> indica escritura de objeto X en la base de datos por la transacción i</a:t>
-                </a:r>
-              </a:p>
-              <a:p>
-                <a:r>
-                  <a:rPr lang="es-CL" sz="2200" b="1" dirty="0"/>
-                  <a:t>Compromiso </a:t>
-                </a:r>
-                <a:r>
-                  <a:rPr lang="es-CL" sz="2200" dirty="0"/>
-                  <a:t>- </a:t>
-                </a:r>
-                <a14:m>
-                  <m:oMath xmlns:m="http://schemas.openxmlformats.org/officeDocument/2006/math">
-                    <m:sSub>
-                      <m:sSubPr>
-                        <m:ctrlPr>
-                          <a:rPr lang="es-CL" sz="2200" b="0" i="1" smtClean="0">
-                            <a:latin typeface="Cambria Math" panose="02040503050406030204" pitchFamily="18" charset="0"/>
-                          </a:rPr>
-                        </m:ctrlPr>
-                      </m:sSubPr>
-                      <m:e>
-                        <m:r>
-                          <a:rPr lang="es-CL" sz="2200" b="0" i="1" smtClean="0">
-                            <a:latin typeface="Cambria Math" panose="02040503050406030204" pitchFamily="18" charset="0"/>
-                          </a:rPr>
-                          <m:t>𝐶</m:t>
-                        </m:r>
-                      </m:e>
-                      <m:sub>
-                        <m:r>
-                          <a:rPr lang="es-CL" sz="2200" b="0" i="1" smtClean="0">
-                            <a:latin typeface="Cambria Math" panose="02040503050406030204" pitchFamily="18" charset="0"/>
-                          </a:rPr>
-                          <m:t>𝑖</m:t>
-                        </m:r>
-                      </m:sub>
-                    </m:sSub>
-                  </m:oMath>
-                </a14:m>
-                <a:r>
-                  <a:rPr lang="es-CL" sz="2200" dirty="0"/>
-                  <a:t> indica el compromiso de la transacción i</a:t>
-                </a:r>
-              </a:p>
-              <a:p>
-                <a:r>
-                  <a:rPr lang="es-CL" sz="2200" b="1" dirty="0"/>
-                  <a:t>Aborto</a:t>
-                </a:r>
-                <a:r>
-                  <a:rPr lang="es-CL" sz="2200" dirty="0"/>
-                  <a:t> - </a:t>
-                </a:r>
-                <a14:m>
-                  <m:oMath xmlns:m="http://schemas.openxmlformats.org/officeDocument/2006/math">
-                    <m:sSub>
-                      <m:sSubPr>
-                        <m:ctrlPr>
-                          <a:rPr lang="es-CL" sz="2200" i="1">
-                            <a:latin typeface="Cambria Math" panose="02040503050406030204" pitchFamily="18" charset="0"/>
-                          </a:rPr>
-                        </m:ctrlPr>
-                      </m:sSubPr>
-                      <m:e>
-                        <m:r>
-                          <a:rPr lang="es-CL" sz="2200" b="0" i="1" smtClean="0">
-                            <a:latin typeface="Cambria Math" panose="02040503050406030204" pitchFamily="18" charset="0"/>
-                          </a:rPr>
-                          <m:t>𝐴</m:t>
-                        </m:r>
-                      </m:e>
-                      <m:sub>
-                        <m:r>
-                          <a:rPr lang="es-CL" sz="2200" i="1">
-                            <a:latin typeface="Cambria Math" panose="02040503050406030204" pitchFamily="18" charset="0"/>
-                          </a:rPr>
-                          <m:t>𝑖</m:t>
-                        </m:r>
-                      </m:sub>
-                    </m:sSub>
-                  </m:oMath>
-                </a14:m>
-                <a:r>
-                  <a:rPr lang="es-CL" sz="2200" dirty="0"/>
-                  <a:t> indica el aborto de la transacción i</a:t>
-                </a:r>
-              </a:p>
-            </p:txBody>
-          </p:sp>
-        </mc:Choice>
-        <mc:Fallback>
-          <p:sp>
-            <p:nvSpPr>
-              <p:cNvPr id="3" name="Marcador de contenido 2">
-                <a:extLst>
-                  <a:ext uri="{FF2B5EF4-FFF2-40B4-BE49-F238E27FC236}">
-                    <a16:creationId xmlns:a16="http://schemas.microsoft.com/office/drawing/2014/main" id="{674A9B87-619A-458A-9F1F-A22950D23A51}"/>
-                  </a:ext>
-                </a:extLst>
-              </p:cNvPr>
-              <p:cNvSpPr>
-                <a:spLocks noGrp="1" noRot="1" noChangeAspect="1" noMove="1" noResize="1" noEditPoints="1" noAdjustHandles="1" noChangeArrowheads="1" noChangeShapeType="1" noTextEdit="1"/>
-              </p:cNvSpPr>
-              <p:nvPr>
-                <p:ph idx="1"/>
-              </p:nvPr>
-            </p:nvSpPr>
-            <p:spPr>
-              <a:blipFill>
-                <a:blip r:embed="rId2"/>
-                <a:stretch>
-                  <a:fillRect l="-387"/>
-                </a:stretch>
-              </a:blipFill>
-            </p:spPr>
-            <p:txBody>
-              <a:bodyPr/>
-              <a:lstStyle/>
-              <a:p>
-                <a:r>
-                  <a:rPr lang="es-CL">
-                    <a:noFill/>
-                  </a:rPr>
-                  <a:t> </a:t>
-                </a:r>
-              </a:p>
-            </p:txBody>
-          </p:sp>
-        </mc:Fallback>
-      </mc:AlternateContent>
-    </p:spTree>
-    <p:extLst>
-      <p:ext uri="{BB962C8B-B14F-4D97-AF65-F5344CB8AC3E}">
-        <p14:creationId xmlns:p14="http://schemas.microsoft.com/office/powerpoint/2010/main" val="2368034604"/>
-      </p:ext>
-    </p:extLst>
-  </p:cSld>
-  <p:clrMapOvr>
-    <a:masterClrMapping/>
-  </p:clrMapOvr>
-</p:sld>
-</file>
-
-<file path=ppt/slides/slide40.xml><?xml version="1.0" encoding="utf-8"?>
+<file path=ppt/slides/slide41.xml><?xml version="1.0" encoding="utf-8"?>
 <p:sld xmlns:a="http://schemas.openxmlformats.org/drawingml/2006/main" xmlns:r="http://schemas.openxmlformats.org/officeDocument/2006/relationships" xmlns:p="http://schemas.openxmlformats.org/presentationml/2006/main">
   <p:cSld>
     <p:spTree>
@@ -15962,99 +16131,6 @@
 </p:sld>
 </file>
 
-<file path=ppt/slides/slide41.xml><?xml version="1.0" encoding="utf-8"?>
-<p:sld xmlns:a="http://schemas.openxmlformats.org/drawingml/2006/main" xmlns:r="http://schemas.openxmlformats.org/officeDocument/2006/relationships" xmlns:p="http://schemas.openxmlformats.org/presentationml/2006/main">
-  <p:cSld>
-    <p:spTree>
-      <p:nvGrpSpPr>
-        <p:cNvPr id="1" name=""/>
-        <p:cNvGrpSpPr/>
-        <p:nvPr/>
-      </p:nvGrpSpPr>
-      <p:grpSpPr>
-        <a:xfrm>
-          <a:off x="0" y="0"/>
-          <a:ext cx="0" cy="0"/>
-          <a:chOff x="0" y="0"/>
-          <a:chExt cx="0" cy="0"/>
-        </a:xfrm>
-      </p:grpSpPr>
-      <p:sp>
-        <p:nvSpPr>
-          <p:cNvPr id="2" name="Título 1">
-            <a:extLst>
-              <a:ext uri="{FF2B5EF4-FFF2-40B4-BE49-F238E27FC236}">
-                <a16:creationId xmlns:a16="http://schemas.microsoft.com/office/drawing/2014/main" id="{191C8431-6870-4CC6-8136-71B453CE80B1}"/>
-              </a:ext>
-            </a:extLst>
-          </p:cNvPr>
-          <p:cNvSpPr>
-            <a:spLocks noGrp="1"/>
-          </p:cNvSpPr>
-          <p:nvPr>
-            <p:ph type="title"/>
-          </p:nvPr>
-        </p:nvSpPr>
-        <p:spPr/>
-        <p:txBody>
-          <a:bodyPr>
-            <a:normAutofit/>
-          </a:bodyPr>
-          <a:lstStyle/>
-          <a:p>
-            <a:r>
-              <a:rPr lang="es-CL" sz="4000" dirty="0"/>
-              <a:t>evitar recuperación en cascada</a:t>
-            </a:r>
-          </a:p>
-        </p:txBody>
-      </p:sp>
-      <p:sp>
-        <p:nvSpPr>
-          <p:cNvPr id="3" name="Marcador de contenido 2">
-            <a:extLst>
-              <a:ext uri="{FF2B5EF4-FFF2-40B4-BE49-F238E27FC236}">
-                <a16:creationId xmlns:a16="http://schemas.microsoft.com/office/drawing/2014/main" id="{2C41A32E-FCB9-4FF3-935B-4E570DC042B3}"/>
-              </a:ext>
-            </a:extLst>
-          </p:cNvPr>
-          <p:cNvSpPr>
-            <a:spLocks noGrp="1"/>
-          </p:cNvSpPr>
-          <p:nvPr>
-            <p:ph idx="1"/>
-          </p:nvPr>
-        </p:nvSpPr>
-        <p:spPr/>
-        <p:txBody>
-          <a:bodyPr>
-            <a:normAutofit/>
-          </a:bodyPr>
-          <a:lstStyle/>
-          <a:p>
-            <a:pPr marL="0" indent="0" algn="ctr">
-              <a:buNone/>
-            </a:pPr>
-            <a:r>
-              <a:rPr lang="es-CL" sz="3600" dirty="0"/>
-              <a:t>Un plan evita recuperación en cascada si toda transacción lee elementos escritos solo por transacciones confirmadas</a:t>
-            </a:r>
-          </a:p>
-        </p:txBody>
-      </p:sp>
-    </p:spTree>
-    <p:extLst>
-      <p:ext uri="{BB962C8B-B14F-4D97-AF65-F5344CB8AC3E}">
-        <p14:creationId xmlns:p14="http://schemas.microsoft.com/office/powerpoint/2010/main" val="3072363134"/>
-      </p:ext>
-    </p:extLst>
-  </p:cSld>
-  <p:clrMapOvr>
-    <a:masterClrMapping/>
-  </p:clrMapOvr>
-</p:sld>
-</file>
-
 <file path=ppt/slides/slide42.xml><?xml version="1.0" encoding="utf-8"?>
 <p:sld xmlns:a="http://schemas.openxmlformats.org/drawingml/2006/main" xmlns:r="http://schemas.openxmlformats.org/officeDocument/2006/relationships" xmlns:p="http://schemas.openxmlformats.org/presentationml/2006/main">
   <p:cSld>
@@ -16097,6 +16173,99 @@
           <a:p>
             <a:r>
               <a:rPr lang="es-CL" sz="4000" dirty="0"/>
+              <a:t>evitar recuperación en cascada</a:t>
+            </a:r>
+          </a:p>
+        </p:txBody>
+      </p:sp>
+      <p:sp>
+        <p:nvSpPr>
+          <p:cNvPr id="3" name="Marcador de contenido 2">
+            <a:extLst>
+              <a:ext uri="{FF2B5EF4-FFF2-40B4-BE49-F238E27FC236}">
+                <a16:creationId xmlns:a16="http://schemas.microsoft.com/office/drawing/2014/main" id="{2C41A32E-FCB9-4FF3-935B-4E570DC042B3}"/>
+              </a:ext>
+            </a:extLst>
+          </p:cNvPr>
+          <p:cNvSpPr>
+            <a:spLocks noGrp="1"/>
+          </p:cNvSpPr>
+          <p:nvPr>
+            <p:ph idx="1"/>
+          </p:nvPr>
+        </p:nvSpPr>
+        <p:spPr/>
+        <p:txBody>
+          <a:bodyPr>
+            <a:normAutofit/>
+          </a:bodyPr>
+          <a:lstStyle/>
+          <a:p>
+            <a:pPr marL="0" indent="0" algn="ctr">
+              <a:buNone/>
+            </a:pPr>
+            <a:r>
+              <a:rPr lang="es-CL" sz="3600" dirty="0"/>
+              <a:t>Un plan evita recuperación en cascada si toda transacción lee elementos escritos solo por transacciones confirmadas</a:t>
+            </a:r>
+          </a:p>
+        </p:txBody>
+      </p:sp>
+    </p:spTree>
+    <p:extLst>
+      <p:ext uri="{BB962C8B-B14F-4D97-AF65-F5344CB8AC3E}">
+        <p14:creationId xmlns:p14="http://schemas.microsoft.com/office/powerpoint/2010/main" val="3072363134"/>
+      </p:ext>
+    </p:extLst>
+  </p:cSld>
+  <p:clrMapOvr>
+    <a:masterClrMapping/>
+  </p:clrMapOvr>
+</p:sld>
+</file>
+
+<file path=ppt/slides/slide43.xml><?xml version="1.0" encoding="utf-8"?>
+<p:sld xmlns:a="http://schemas.openxmlformats.org/drawingml/2006/main" xmlns:r="http://schemas.openxmlformats.org/officeDocument/2006/relationships" xmlns:p="http://schemas.openxmlformats.org/presentationml/2006/main">
+  <p:cSld>
+    <p:spTree>
+      <p:nvGrpSpPr>
+        <p:cNvPr id="1" name=""/>
+        <p:cNvGrpSpPr/>
+        <p:nvPr/>
+      </p:nvGrpSpPr>
+      <p:grpSpPr>
+        <a:xfrm>
+          <a:off x="0" y="0"/>
+          <a:ext cx="0" cy="0"/>
+          <a:chOff x="0" y="0"/>
+          <a:chExt cx="0" cy="0"/>
+        </a:xfrm>
+      </p:grpSpPr>
+      <p:sp>
+        <p:nvSpPr>
+          <p:cNvPr id="2" name="Título 1">
+            <a:extLst>
+              <a:ext uri="{FF2B5EF4-FFF2-40B4-BE49-F238E27FC236}">
+                <a16:creationId xmlns:a16="http://schemas.microsoft.com/office/drawing/2014/main" id="{191C8431-6870-4CC6-8136-71B453CE80B1}"/>
+              </a:ext>
+            </a:extLst>
+          </p:cNvPr>
+          <p:cNvSpPr>
+            <a:spLocks noGrp="1"/>
+          </p:cNvSpPr>
+          <p:nvPr>
+            <p:ph type="title"/>
+          </p:nvPr>
+        </p:nvSpPr>
+        <p:spPr/>
+        <p:txBody>
+          <a:bodyPr>
+            <a:normAutofit/>
+          </a:bodyPr>
+          <a:lstStyle/>
+          <a:p>
+            <a:r>
+              <a:rPr lang="es-CL" sz="4000" dirty="0"/>
               <a:t>Evitar recuperación en cascada</a:t>
             </a:r>
           </a:p>
@@ -16118,13 +16287,13 @@
             <p:ph idx="1"/>
             <p:extLst>
               <p:ext uri="{D42A27DB-BD31-4B8C-83A1-F6EECF244321}">
-                <p14:modId xmlns:p14="http://schemas.microsoft.com/office/powerpoint/2010/main" val="3451281461"/>
+                <p14:modId xmlns:p14="http://schemas.microsoft.com/office/powerpoint/2010/main" val="2020267787"/>
               </p:ext>
             </p:extLst>
           </p:nvPr>
         </p:nvGraphicFramePr>
         <p:xfrm>
-          <a:off x="3622964" y="2541443"/>
+          <a:off x="3627446" y="2232164"/>
           <a:ext cx="4946073" cy="3200400"/>
         </p:xfrm>
         <a:graphic>
@@ -16808,7 +16977,7 @@
         </p:nvSpPr>
         <p:spPr>
           <a:xfrm>
-            <a:off x="4793673" y="3865418"/>
+            <a:off x="4668167" y="5741843"/>
             <a:ext cx="2660072" cy="914400"/>
           </a:xfrm>
           <a:prstGeom prst="rect">
@@ -17014,7 +17183,7 @@
 </p:sld>
 </file>
 
-<file path=ppt/slides/slide43.xml><?xml version="1.0" encoding="utf-8"?>
+<file path=ppt/slides/slide44.xml><?xml version="1.0" encoding="utf-8"?>
 <p:sld xmlns:a="http://schemas.openxmlformats.org/drawingml/2006/main" xmlns:r="http://schemas.openxmlformats.org/officeDocument/2006/relationships" xmlns:p="http://schemas.openxmlformats.org/presentationml/2006/main">
   <p:cSld>
     <p:spTree>

</xml_diff>